<commit_message>
Change image on 17-18 slide
</commit_message>
<xml_diff>
--- a/slides/compatibility/Non_editable_slides.pptx
+++ b/slides/compatibility/Non_editable_slides.pptx
@@ -27,7 +27,7 @@
     <p:sldId id="275" r:id="rId21"/>
   </p:sldIdLst>
   <p:sldSz cx="9144000" cy="5143500" type="screen16x9"/>
-  <p:notesSz cx="7104063" cy="10234613"/>
+  <p:notesSz cx="6858000" cy="9144000"/>
   <p:defaultTextStyle>
     <a:defPPr>
       <a:defRPr lang="ru-RU"/>
@@ -148,7 +148,7 @@
           <p:cNvPr id="2" name="Заголовок 1">
             <a:extLst>
               <a:ext uri="{FF2B5EF4-FFF2-40B4-BE49-F238E27FC236}">
-                <a16:creationId xmlns:a16="http://schemas.microsoft.com/office/drawing/2014/main" id="{168F07FE-AB06-0D56-641E-FB7C0A6BE4F6}"/>
+                <a16:creationId xmlns:a16="http://schemas.microsoft.com/office/drawing/2014/main" id="{0C57BA21-2440-7C9B-07E0-F08C74A521BD}"/>
               </a:ext>
             </a:extLst>
           </p:cNvPr>
@@ -176,7 +176,7 @@
           <p:cNvPr id="3" name="Дата 2">
             <a:extLst>
               <a:ext uri="{FF2B5EF4-FFF2-40B4-BE49-F238E27FC236}">
-                <a16:creationId xmlns:a16="http://schemas.microsoft.com/office/drawing/2014/main" id="{3197FDD0-11BF-5DBC-04CC-DB759AF318E8}"/>
+                <a16:creationId xmlns:a16="http://schemas.microsoft.com/office/drawing/2014/main" id="{0798C962-8ED5-17FF-6E6D-5F9A4AE5D714}"/>
               </a:ext>
             </a:extLst>
           </p:cNvPr>
@@ -192,7 +192,7 @@
           <a:bodyPr/>
           <a:lstStyle/>
           <a:p>
-            <a:fld id="{DEEDDB57-570C-429C-8A7F-857C6F02902B}" type="datetimeFigureOut">
+            <a:fld id="{A19F129E-53C4-4FDD-860B-958B4B66090E}" type="datetimeFigureOut">
               <a:rPr lang="ru-RU" smtClean="0"/>
               <a:t>20.01.2026</a:t>
             </a:fld>
@@ -205,7 +205,7 @@
           <p:cNvPr id="4" name="Нижний колонтитул 3">
             <a:extLst>
               <a:ext uri="{FF2B5EF4-FFF2-40B4-BE49-F238E27FC236}">
-                <a16:creationId xmlns:a16="http://schemas.microsoft.com/office/drawing/2014/main" id="{46F8DB0C-B2F9-7482-7F52-EA5B15ABFF0C}"/>
+                <a16:creationId xmlns:a16="http://schemas.microsoft.com/office/drawing/2014/main" id="{AFB238A4-BA4D-CA1A-9231-6E7785156BAB}"/>
               </a:ext>
             </a:extLst>
           </p:cNvPr>
@@ -230,7 +230,7 @@
           <p:cNvPr id="5" name="Номер слайда 4">
             <a:extLst>
               <a:ext uri="{FF2B5EF4-FFF2-40B4-BE49-F238E27FC236}">
-                <a16:creationId xmlns:a16="http://schemas.microsoft.com/office/drawing/2014/main" id="{C9F70706-DB9B-5EB0-9ABF-965E21A25E0F}"/>
+                <a16:creationId xmlns:a16="http://schemas.microsoft.com/office/drawing/2014/main" id="{5185ACD2-F01E-6DF2-3728-3D3DD7654487}"/>
               </a:ext>
             </a:extLst>
           </p:cNvPr>
@@ -246,7 +246,7 @@
           <a:bodyPr/>
           <a:lstStyle/>
           <a:p>
-            <a:fld id="{68B8AAC7-C8E0-456E-B73E-19BCAD8EE160}" type="slidenum">
+            <a:fld id="{3F47B613-F22A-42B8-B2C2-65D232F7D5FE}" type="slidenum">
               <a:rPr lang="ru-RU" smtClean="0"/>
               <a:t>‹#›</a:t>
             </a:fld>
@@ -257,7 +257,7 @@
     </p:spTree>
     <p:extLst>
       <p:ext uri="{BB962C8B-B14F-4D97-AF65-F5344CB8AC3E}">
-        <p14:creationId xmlns:p14="http://schemas.microsoft.com/office/powerpoint/2010/main" val="3420888325"/>
+        <p14:creationId xmlns:p14="http://schemas.microsoft.com/office/powerpoint/2010/main" val="3540872543"/>
       </p:ext>
     </p:extLst>
   </p:cSld>
@@ -294,7 +294,7 @@
           <p:cNvPr id="2" name="Заголовок 1">
             <a:extLst>
               <a:ext uri="{FF2B5EF4-FFF2-40B4-BE49-F238E27FC236}">
-                <a16:creationId xmlns:a16="http://schemas.microsoft.com/office/drawing/2014/main" id="{D8125ECE-4AB0-7296-DADA-D72364A1056A}"/>
+                <a16:creationId xmlns:a16="http://schemas.microsoft.com/office/drawing/2014/main" id="{93AF2610-4BBA-C82B-69BD-28E283F69F1E}"/>
               </a:ext>
             </a:extLst>
           </p:cNvPr>
@@ -332,7 +332,7 @@
           <p:cNvPr id="3" name="Текст 2">
             <a:extLst>
               <a:ext uri="{FF2B5EF4-FFF2-40B4-BE49-F238E27FC236}">
-                <a16:creationId xmlns:a16="http://schemas.microsoft.com/office/drawing/2014/main" id="{DF6D8FFF-312A-91F0-AA6A-A7F3E3A2551A}"/>
+                <a16:creationId xmlns:a16="http://schemas.microsoft.com/office/drawing/2014/main" id="{F8337587-3540-4A9E-06BF-CD7299CF635F}"/>
               </a:ext>
             </a:extLst>
           </p:cNvPr>
@@ -399,7 +399,7 @@
           <p:cNvPr id="4" name="Дата 3">
             <a:extLst>
               <a:ext uri="{FF2B5EF4-FFF2-40B4-BE49-F238E27FC236}">
-                <a16:creationId xmlns:a16="http://schemas.microsoft.com/office/drawing/2014/main" id="{41B35FE4-A4A5-1E33-D446-E4ABCD7CE5A9}"/>
+                <a16:creationId xmlns:a16="http://schemas.microsoft.com/office/drawing/2014/main" id="{7D8FEF98-37A6-B32A-9528-60A88DBA2D53}"/>
               </a:ext>
             </a:extLst>
           </p:cNvPr>
@@ -433,7 +433,7 @@
             </a:lvl1pPr>
           </a:lstStyle>
           <a:p>
-            <a:fld id="{DEEDDB57-570C-429C-8A7F-857C6F02902B}" type="datetimeFigureOut">
+            <a:fld id="{A19F129E-53C4-4FDD-860B-958B4B66090E}" type="datetimeFigureOut">
               <a:rPr lang="ru-RU" smtClean="0"/>
               <a:t>20.01.2026</a:t>
             </a:fld>
@@ -446,7 +446,7 @@
           <p:cNvPr id="5" name="Нижний колонтитул 4">
             <a:extLst>
               <a:ext uri="{FF2B5EF4-FFF2-40B4-BE49-F238E27FC236}">
-                <a16:creationId xmlns:a16="http://schemas.microsoft.com/office/drawing/2014/main" id="{EC3BB4C7-A93F-DB9C-CEFA-759865352F4B}"/>
+                <a16:creationId xmlns:a16="http://schemas.microsoft.com/office/drawing/2014/main" id="{B894395A-5C66-2479-784B-A71D3CA8AA9E}"/>
               </a:ext>
             </a:extLst>
           </p:cNvPr>
@@ -489,7 +489,7 @@
           <p:cNvPr id="6" name="Номер слайда 5">
             <a:extLst>
               <a:ext uri="{FF2B5EF4-FFF2-40B4-BE49-F238E27FC236}">
-                <a16:creationId xmlns:a16="http://schemas.microsoft.com/office/drawing/2014/main" id="{4FA5F960-DAC6-A20D-4A5C-F823B613D678}"/>
+                <a16:creationId xmlns:a16="http://schemas.microsoft.com/office/drawing/2014/main" id="{D6140CF4-E54F-ED9F-64DF-35F03348B2BB}"/>
               </a:ext>
             </a:extLst>
           </p:cNvPr>
@@ -523,7 +523,7 @@
             </a:lvl1pPr>
           </a:lstStyle>
           <a:p>
-            <a:fld id="{68B8AAC7-C8E0-456E-B73E-19BCAD8EE160}" type="slidenum">
+            <a:fld id="{3F47B613-F22A-42B8-B2C2-65D232F7D5FE}" type="slidenum">
               <a:rPr lang="ru-RU" smtClean="0"/>
               <a:t>‹#›</a:t>
             </a:fld>
@@ -534,7 +534,7 @@
     </p:spTree>
     <p:extLst>
       <p:ext uri="{BB962C8B-B14F-4D97-AF65-F5344CB8AC3E}">
-        <p14:creationId xmlns:p14="http://schemas.microsoft.com/office/powerpoint/2010/main" val="3080805178"/>
+        <p14:creationId xmlns:p14="http://schemas.microsoft.com/office/powerpoint/2010/main" val="2930094068"/>
       </p:ext>
     </p:extLst>
   </p:cSld>
@@ -853,7 +853,7 @@
           <p:cNvPr id="2" name="Заголовок 1" hidden="1">
             <a:extLst>
               <a:ext uri="{FF2B5EF4-FFF2-40B4-BE49-F238E27FC236}">
-                <a16:creationId xmlns:a16="http://schemas.microsoft.com/office/drawing/2014/main" id="{E17DD267-AD7C-4C5C-B86F-796B7CC4D3C8}"/>
+                <a16:creationId xmlns:a16="http://schemas.microsoft.com/office/drawing/2014/main" id="{F6C20589-3AB8-6A5E-B534-1243046915C6}"/>
               </a:ext>
             </a:extLst>
           </p:cNvPr>
@@ -895,7 +895,7 @@
           <p:cNvPr id="3" name="Рисунок 2">
             <a:extLst>
               <a:ext uri="{FF2B5EF4-FFF2-40B4-BE49-F238E27FC236}">
-                <a16:creationId xmlns:a16="http://schemas.microsoft.com/office/drawing/2014/main" id="{937468DC-9EB8-17A9-9637-5143776D4CE7}"/>
+                <a16:creationId xmlns:a16="http://schemas.microsoft.com/office/drawing/2014/main" id="{123E17F9-BF24-2A61-0544-2D655980DF4E}"/>
               </a:ext>
             </a:extLst>
           </p:cNvPr>
@@ -921,7 +921,7 @@
     </p:spTree>
     <p:extLst>
       <p:ext uri="{BB962C8B-B14F-4D97-AF65-F5344CB8AC3E}">
-        <p14:creationId xmlns:p14="http://schemas.microsoft.com/office/powerpoint/2010/main" val="970494305"/>
+        <p14:creationId xmlns:p14="http://schemas.microsoft.com/office/powerpoint/2010/main" val="1881428580"/>
       </p:ext>
     </p:extLst>
   </p:cSld>
@@ -962,7 +962,7 @@
           <p:cNvPr id="2" name="Заголовок 1" hidden="1">
             <a:extLst>
               <a:ext uri="{FF2B5EF4-FFF2-40B4-BE49-F238E27FC236}">
-                <a16:creationId xmlns:a16="http://schemas.microsoft.com/office/drawing/2014/main" id="{CD74DB74-92CC-C196-D04B-FB624FE1E24E}"/>
+                <a16:creationId xmlns:a16="http://schemas.microsoft.com/office/drawing/2014/main" id="{5446445A-2FD6-37A7-7E0E-847D541F5A0C}"/>
               </a:ext>
             </a:extLst>
           </p:cNvPr>
@@ -987,7 +987,7 @@
           <p:cNvPr id="3" name="Рисунок 2">
             <a:extLst>
               <a:ext uri="{FF2B5EF4-FFF2-40B4-BE49-F238E27FC236}">
-                <a16:creationId xmlns:a16="http://schemas.microsoft.com/office/drawing/2014/main" id="{F3CD26DB-EE0E-4130-E0A9-EC1E04139400}"/>
+                <a16:creationId xmlns:a16="http://schemas.microsoft.com/office/drawing/2014/main" id="{83C7B121-746E-64A3-37C0-3944915FF7F1}"/>
               </a:ext>
             </a:extLst>
           </p:cNvPr>
@@ -1013,7 +1013,7 @@
     </p:spTree>
     <p:extLst>
       <p:ext uri="{BB962C8B-B14F-4D97-AF65-F5344CB8AC3E}">
-        <p14:creationId xmlns:p14="http://schemas.microsoft.com/office/powerpoint/2010/main" val="3492548616"/>
+        <p14:creationId xmlns:p14="http://schemas.microsoft.com/office/powerpoint/2010/main" val="3933258246"/>
       </p:ext>
     </p:extLst>
   </p:cSld>
@@ -1054,7 +1054,7 @@
           <p:cNvPr id="2" name="Заголовок 1" hidden="1">
             <a:extLst>
               <a:ext uri="{FF2B5EF4-FFF2-40B4-BE49-F238E27FC236}">
-                <a16:creationId xmlns:a16="http://schemas.microsoft.com/office/drawing/2014/main" id="{8D7FCA86-EC42-CFF2-4EB8-B513676C7DA4}"/>
+                <a16:creationId xmlns:a16="http://schemas.microsoft.com/office/drawing/2014/main" id="{CA782CFA-9EA5-8217-3277-321CD4563F58}"/>
               </a:ext>
             </a:extLst>
           </p:cNvPr>
@@ -1079,7 +1079,7 @@
           <p:cNvPr id="3" name="Рисунок 2">
             <a:extLst>
               <a:ext uri="{FF2B5EF4-FFF2-40B4-BE49-F238E27FC236}">
-                <a16:creationId xmlns:a16="http://schemas.microsoft.com/office/drawing/2014/main" id="{7A1C53EB-1A91-2159-402F-41EA2A604B67}"/>
+                <a16:creationId xmlns:a16="http://schemas.microsoft.com/office/drawing/2014/main" id="{0F3BC2BF-2B3F-7761-D69E-06BD9A9E05E7}"/>
               </a:ext>
             </a:extLst>
           </p:cNvPr>
@@ -1105,7 +1105,7 @@
     </p:spTree>
     <p:extLst>
       <p:ext uri="{BB962C8B-B14F-4D97-AF65-F5344CB8AC3E}">
-        <p14:creationId xmlns:p14="http://schemas.microsoft.com/office/powerpoint/2010/main" val="16029436"/>
+        <p14:creationId xmlns:p14="http://schemas.microsoft.com/office/powerpoint/2010/main" val="1823948890"/>
       </p:ext>
     </p:extLst>
   </p:cSld>
@@ -1146,7 +1146,7 @@
           <p:cNvPr id="2" name="Заголовок 1" hidden="1">
             <a:extLst>
               <a:ext uri="{FF2B5EF4-FFF2-40B4-BE49-F238E27FC236}">
-                <a16:creationId xmlns:a16="http://schemas.microsoft.com/office/drawing/2014/main" id="{9B6BAA77-2B87-4334-E29F-6D5083002B36}"/>
+                <a16:creationId xmlns:a16="http://schemas.microsoft.com/office/drawing/2014/main" id="{2BFD400B-C3DB-C371-9F8B-3388E93784A6}"/>
               </a:ext>
             </a:extLst>
           </p:cNvPr>
@@ -1171,7 +1171,7 @@
           <p:cNvPr id="3" name="Рисунок 2">
             <a:extLst>
               <a:ext uri="{FF2B5EF4-FFF2-40B4-BE49-F238E27FC236}">
-                <a16:creationId xmlns:a16="http://schemas.microsoft.com/office/drawing/2014/main" id="{22678908-7BE9-3E7D-494B-7BA484AFFFFD}"/>
+                <a16:creationId xmlns:a16="http://schemas.microsoft.com/office/drawing/2014/main" id="{959BF4B4-DD62-7AA9-A87F-C5DC34621BDB}"/>
               </a:ext>
             </a:extLst>
           </p:cNvPr>
@@ -1197,7 +1197,7 @@
     </p:spTree>
     <p:extLst>
       <p:ext uri="{BB962C8B-B14F-4D97-AF65-F5344CB8AC3E}">
-        <p14:creationId xmlns:p14="http://schemas.microsoft.com/office/powerpoint/2010/main" val="631814943"/>
+        <p14:creationId xmlns:p14="http://schemas.microsoft.com/office/powerpoint/2010/main" val="1211221730"/>
       </p:ext>
     </p:extLst>
   </p:cSld>
@@ -1247,7 +1247,7 @@
           <p:cNvPr id="2" name="Заголовок 1" hidden="1">
             <a:extLst>
               <a:ext uri="{FF2B5EF4-FFF2-40B4-BE49-F238E27FC236}">
-                <a16:creationId xmlns:a16="http://schemas.microsoft.com/office/drawing/2014/main" id="{34D3FCAF-6D5C-E4C5-78B4-E1B72AB25E1B}"/>
+                <a16:creationId xmlns:a16="http://schemas.microsoft.com/office/drawing/2014/main" id="{89A5D42F-E131-4278-A4F3-C927236B7751}"/>
               </a:ext>
             </a:extLst>
           </p:cNvPr>
@@ -1289,7 +1289,7 @@
           <p:cNvPr id="3" name="Рисунок 2">
             <a:extLst>
               <a:ext uri="{FF2B5EF4-FFF2-40B4-BE49-F238E27FC236}">
-                <a16:creationId xmlns:a16="http://schemas.microsoft.com/office/drawing/2014/main" id="{12317F9C-1739-8085-546B-DDC2EB2C2C1F}"/>
+                <a16:creationId xmlns:a16="http://schemas.microsoft.com/office/drawing/2014/main" id="{889AA4BD-4E7B-D5F3-1EFE-A0912FA685E5}"/>
               </a:ext>
             </a:extLst>
           </p:cNvPr>
@@ -1315,7 +1315,7 @@
     </p:spTree>
     <p:extLst>
       <p:ext uri="{BB962C8B-B14F-4D97-AF65-F5344CB8AC3E}">
-        <p14:creationId xmlns:p14="http://schemas.microsoft.com/office/powerpoint/2010/main" val="134706332"/>
+        <p14:creationId xmlns:p14="http://schemas.microsoft.com/office/powerpoint/2010/main" val="679370200"/>
       </p:ext>
     </p:extLst>
   </p:cSld>
@@ -1356,7 +1356,7 @@
           <p:cNvPr id="2" name="Заголовок 1" hidden="1">
             <a:extLst>
               <a:ext uri="{FF2B5EF4-FFF2-40B4-BE49-F238E27FC236}">
-                <a16:creationId xmlns:a16="http://schemas.microsoft.com/office/drawing/2014/main" id="{7A040246-2E1D-D7D0-6FD0-CEB19C398165}"/>
+                <a16:creationId xmlns:a16="http://schemas.microsoft.com/office/drawing/2014/main" id="{3A6E2AE4-F706-4B0F-79BC-0E76148B0A3C}"/>
               </a:ext>
             </a:extLst>
           </p:cNvPr>
@@ -1381,7 +1381,7 @@
           <p:cNvPr id="3" name="Рисунок 2">
             <a:extLst>
               <a:ext uri="{FF2B5EF4-FFF2-40B4-BE49-F238E27FC236}">
-                <a16:creationId xmlns:a16="http://schemas.microsoft.com/office/drawing/2014/main" id="{BB52E560-8E73-156A-A878-C66B34CCBC51}"/>
+                <a16:creationId xmlns:a16="http://schemas.microsoft.com/office/drawing/2014/main" id="{ABE81783-5625-ADCC-C40F-9DF97ADEEADE}"/>
               </a:ext>
             </a:extLst>
           </p:cNvPr>
@@ -1407,7 +1407,7 @@
     </p:spTree>
     <p:extLst>
       <p:ext uri="{BB962C8B-B14F-4D97-AF65-F5344CB8AC3E}">
-        <p14:creationId xmlns:p14="http://schemas.microsoft.com/office/powerpoint/2010/main" val="843145303"/>
+        <p14:creationId xmlns:p14="http://schemas.microsoft.com/office/powerpoint/2010/main" val="911391747"/>
       </p:ext>
     </p:extLst>
   </p:cSld>
@@ -1448,7 +1448,7 @@
           <p:cNvPr id="2" name="Заголовок 1" hidden="1">
             <a:extLst>
               <a:ext uri="{FF2B5EF4-FFF2-40B4-BE49-F238E27FC236}">
-                <a16:creationId xmlns:a16="http://schemas.microsoft.com/office/drawing/2014/main" id="{E3DD408A-0A52-615C-849E-CED8B8CAD0CD}"/>
+                <a16:creationId xmlns:a16="http://schemas.microsoft.com/office/drawing/2014/main" id="{CAA09DF4-15C9-B097-D667-5875EDC06824}"/>
               </a:ext>
             </a:extLst>
           </p:cNvPr>
@@ -1482,7 +1482,7 @@
           <p:cNvPr id="3" name="Рисунок 2">
             <a:extLst>
               <a:ext uri="{FF2B5EF4-FFF2-40B4-BE49-F238E27FC236}">
-                <a16:creationId xmlns:a16="http://schemas.microsoft.com/office/drawing/2014/main" id="{592D2EBE-83BE-4602-D0D3-B9F5BD522ACA}"/>
+                <a16:creationId xmlns:a16="http://schemas.microsoft.com/office/drawing/2014/main" id="{87A4786F-AD35-CA26-7FCD-520AF58E6DF5}"/>
               </a:ext>
             </a:extLst>
           </p:cNvPr>
@@ -1508,7 +1508,7 @@
     </p:spTree>
     <p:extLst>
       <p:ext uri="{BB962C8B-B14F-4D97-AF65-F5344CB8AC3E}">
-        <p14:creationId xmlns:p14="http://schemas.microsoft.com/office/powerpoint/2010/main" val="808907682"/>
+        <p14:creationId xmlns:p14="http://schemas.microsoft.com/office/powerpoint/2010/main" val="3737048922"/>
       </p:ext>
     </p:extLst>
   </p:cSld>
@@ -1549,7 +1549,7 @@
           <p:cNvPr id="2" name="Заголовок 1" hidden="1">
             <a:extLst>
               <a:ext uri="{FF2B5EF4-FFF2-40B4-BE49-F238E27FC236}">
-                <a16:creationId xmlns:a16="http://schemas.microsoft.com/office/drawing/2014/main" id="{90A6497E-7DD7-945D-1216-8AF22AF7DE94}"/>
+                <a16:creationId xmlns:a16="http://schemas.microsoft.com/office/drawing/2014/main" id="{AF36C6C3-1164-1B05-14D7-F946BE410100}"/>
               </a:ext>
             </a:extLst>
           </p:cNvPr>
@@ -1605,7 +1605,7 @@
           <p:cNvPr id="3" name="Рисунок 2">
             <a:extLst>
               <a:ext uri="{FF2B5EF4-FFF2-40B4-BE49-F238E27FC236}">
-                <a16:creationId xmlns:a16="http://schemas.microsoft.com/office/drawing/2014/main" id="{D7CE3289-030F-8662-84C6-9AF828EAA699}"/>
+                <a16:creationId xmlns:a16="http://schemas.microsoft.com/office/drawing/2014/main" id="{D8B8E01F-F247-3914-A718-2587B9EEB5F3}"/>
               </a:ext>
             </a:extLst>
           </p:cNvPr>
@@ -1631,7 +1631,7 @@
     </p:spTree>
     <p:extLst>
       <p:ext uri="{BB962C8B-B14F-4D97-AF65-F5344CB8AC3E}">
-        <p14:creationId xmlns:p14="http://schemas.microsoft.com/office/powerpoint/2010/main" val="2968162229"/>
+        <p14:creationId xmlns:p14="http://schemas.microsoft.com/office/powerpoint/2010/main" val="1134773971"/>
       </p:ext>
     </p:extLst>
   </p:cSld>
@@ -1672,7 +1672,7 @@
           <p:cNvPr id="2" name="Заголовок 1" hidden="1">
             <a:extLst>
               <a:ext uri="{FF2B5EF4-FFF2-40B4-BE49-F238E27FC236}">
-                <a16:creationId xmlns:a16="http://schemas.microsoft.com/office/drawing/2014/main" id="{E09B5E10-7D21-7E0F-F2D8-FB00357CDDA8}"/>
+                <a16:creationId xmlns:a16="http://schemas.microsoft.com/office/drawing/2014/main" id="{13B3DA2D-7690-CFEB-55B8-7D511A04742E}"/>
               </a:ext>
             </a:extLst>
           </p:cNvPr>
@@ -1706,7 +1706,7 @@
           <p:cNvPr id="3" name="Рисунок 2">
             <a:extLst>
               <a:ext uri="{FF2B5EF4-FFF2-40B4-BE49-F238E27FC236}">
-                <a16:creationId xmlns:a16="http://schemas.microsoft.com/office/drawing/2014/main" id="{61CFCE1C-ADC1-24CB-55BB-081906C3A562}"/>
+                <a16:creationId xmlns:a16="http://schemas.microsoft.com/office/drawing/2014/main" id="{BCC86FD8-A534-D7FD-79A9-A3A9E0673365}"/>
               </a:ext>
             </a:extLst>
           </p:cNvPr>
@@ -1732,7 +1732,7 @@
     </p:spTree>
     <p:extLst>
       <p:ext uri="{BB962C8B-B14F-4D97-AF65-F5344CB8AC3E}">
-        <p14:creationId xmlns:p14="http://schemas.microsoft.com/office/powerpoint/2010/main" val="2396813897"/>
+        <p14:creationId xmlns:p14="http://schemas.microsoft.com/office/powerpoint/2010/main" val="1312897552"/>
       </p:ext>
     </p:extLst>
   </p:cSld>
@@ -1773,7 +1773,7 @@
           <p:cNvPr id="2" name="Заголовок 1" hidden="1">
             <a:extLst>
               <a:ext uri="{FF2B5EF4-FFF2-40B4-BE49-F238E27FC236}">
-                <a16:creationId xmlns:a16="http://schemas.microsoft.com/office/drawing/2014/main" id="{77209FF9-DEAB-3A50-83AB-5305E49241A5}"/>
+                <a16:creationId xmlns:a16="http://schemas.microsoft.com/office/drawing/2014/main" id="{37C9398E-2764-526C-BD6D-8CA511DDDB58}"/>
               </a:ext>
             </a:extLst>
           </p:cNvPr>
@@ -1798,7 +1798,7 @@
           <p:cNvPr id="3" name="Рисунок 2">
             <a:extLst>
               <a:ext uri="{FF2B5EF4-FFF2-40B4-BE49-F238E27FC236}">
-                <a16:creationId xmlns:a16="http://schemas.microsoft.com/office/drawing/2014/main" id="{C8D83D28-20E3-25BC-91F8-1BED476B5237}"/>
+                <a16:creationId xmlns:a16="http://schemas.microsoft.com/office/drawing/2014/main" id="{39EEDC42-6950-94D9-CE52-86E1D8487CEA}"/>
               </a:ext>
             </a:extLst>
           </p:cNvPr>
@@ -1824,7 +1824,7 @@
     </p:spTree>
     <p:extLst>
       <p:ext uri="{BB962C8B-B14F-4D97-AF65-F5344CB8AC3E}">
-        <p14:creationId xmlns:p14="http://schemas.microsoft.com/office/powerpoint/2010/main" val="3734822872"/>
+        <p14:creationId xmlns:p14="http://schemas.microsoft.com/office/powerpoint/2010/main" val="549091284"/>
       </p:ext>
     </p:extLst>
   </p:cSld>
@@ -1874,7 +1874,7 @@
           <p:cNvPr id="2" name="Заголовок 1" hidden="1">
             <a:extLst>
               <a:ext uri="{FF2B5EF4-FFF2-40B4-BE49-F238E27FC236}">
-                <a16:creationId xmlns:a16="http://schemas.microsoft.com/office/drawing/2014/main" id="{00270D4C-C4B5-7844-59ED-7A43E122979B}"/>
+                <a16:creationId xmlns:a16="http://schemas.microsoft.com/office/drawing/2014/main" id="{87B78FA6-3A3A-A683-025F-AEBEEF7F089B}"/>
               </a:ext>
             </a:extLst>
           </p:cNvPr>
@@ -1907,7 +1907,7 @@
           <p:cNvPr id="3" name="Рисунок 2">
             <a:extLst>
               <a:ext uri="{FF2B5EF4-FFF2-40B4-BE49-F238E27FC236}">
-                <a16:creationId xmlns:a16="http://schemas.microsoft.com/office/drawing/2014/main" id="{37C7FBD3-347C-E375-4E86-7079E8AAF20B}"/>
+                <a16:creationId xmlns:a16="http://schemas.microsoft.com/office/drawing/2014/main" id="{8B61DC71-B831-21E3-A646-576F1007E628}"/>
               </a:ext>
             </a:extLst>
           </p:cNvPr>
@@ -1933,7 +1933,7 @@
     </p:spTree>
     <p:extLst>
       <p:ext uri="{BB962C8B-B14F-4D97-AF65-F5344CB8AC3E}">
-        <p14:creationId xmlns:p14="http://schemas.microsoft.com/office/powerpoint/2010/main" val="13679862"/>
+        <p14:creationId xmlns:p14="http://schemas.microsoft.com/office/powerpoint/2010/main" val="4285659805"/>
       </p:ext>
     </p:extLst>
   </p:cSld>
@@ -1974,7 +1974,7 @@
           <p:cNvPr id="2" name="Заголовок 1" hidden="1">
             <a:extLst>
               <a:ext uri="{FF2B5EF4-FFF2-40B4-BE49-F238E27FC236}">
-                <a16:creationId xmlns:a16="http://schemas.microsoft.com/office/drawing/2014/main" id="{E32E9816-7747-BEB6-3D4F-8848B29544DE}"/>
+                <a16:creationId xmlns:a16="http://schemas.microsoft.com/office/drawing/2014/main" id="{7F3C3F52-E3DE-8582-969E-6B5BE5EDDB1C}"/>
               </a:ext>
             </a:extLst>
           </p:cNvPr>
@@ -2016,7 +2016,7 @@
           <p:cNvPr id="3" name="Рисунок 2">
             <a:extLst>
               <a:ext uri="{FF2B5EF4-FFF2-40B4-BE49-F238E27FC236}">
-                <a16:creationId xmlns:a16="http://schemas.microsoft.com/office/drawing/2014/main" id="{F9D45994-1016-62AD-F85F-B7F6BF623DC4}"/>
+                <a16:creationId xmlns:a16="http://schemas.microsoft.com/office/drawing/2014/main" id="{2C59F066-9B6B-9EB0-7C17-207911DCFA92}"/>
               </a:ext>
             </a:extLst>
           </p:cNvPr>
@@ -2042,7 +2042,7 @@
     </p:spTree>
     <p:extLst>
       <p:ext uri="{BB962C8B-B14F-4D97-AF65-F5344CB8AC3E}">
-        <p14:creationId xmlns:p14="http://schemas.microsoft.com/office/powerpoint/2010/main" val="3768306969"/>
+        <p14:creationId xmlns:p14="http://schemas.microsoft.com/office/powerpoint/2010/main" val="243597127"/>
       </p:ext>
     </p:extLst>
   </p:cSld>
@@ -2083,7 +2083,7 @@
           <p:cNvPr id="2" name="Заголовок 1" hidden="1">
             <a:extLst>
               <a:ext uri="{FF2B5EF4-FFF2-40B4-BE49-F238E27FC236}">
-                <a16:creationId xmlns:a16="http://schemas.microsoft.com/office/drawing/2014/main" id="{9F806A7F-F9BD-41F1-8091-707990319209}"/>
+                <a16:creationId xmlns:a16="http://schemas.microsoft.com/office/drawing/2014/main" id="{02516CBC-33FC-5828-A440-2BCFA28CE603}"/>
               </a:ext>
             </a:extLst>
           </p:cNvPr>
@@ -2125,7 +2125,7 @@
           <p:cNvPr id="3" name="Рисунок 2">
             <a:extLst>
               <a:ext uri="{FF2B5EF4-FFF2-40B4-BE49-F238E27FC236}">
-                <a16:creationId xmlns:a16="http://schemas.microsoft.com/office/drawing/2014/main" id="{A520019B-BA79-A363-BE15-6A9AD9FD4D60}"/>
+                <a16:creationId xmlns:a16="http://schemas.microsoft.com/office/drawing/2014/main" id="{0B535F7C-630A-950C-3DEA-1951F125E7E4}"/>
               </a:ext>
             </a:extLst>
           </p:cNvPr>
@@ -2151,7 +2151,7 @@
     </p:spTree>
     <p:extLst>
       <p:ext uri="{BB962C8B-B14F-4D97-AF65-F5344CB8AC3E}">
-        <p14:creationId xmlns:p14="http://schemas.microsoft.com/office/powerpoint/2010/main" val="1239357064"/>
+        <p14:creationId xmlns:p14="http://schemas.microsoft.com/office/powerpoint/2010/main" val="160649651"/>
       </p:ext>
     </p:extLst>
   </p:cSld>
@@ -2192,7 +2192,7 @@
           <p:cNvPr id="2" name="Заголовок 1" hidden="1">
             <a:extLst>
               <a:ext uri="{FF2B5EF4-FFF2-40B4-BE49-F238E27FC236}">
-                <a16:creationId xmlns:a16="http://schemas.microsoft.com/office/drawing/2014/main" id="{F8D63AC5-9609-13D8-EADC-DCFD1C7F6BA3}"/>
+                <a16:creationId xmlns:a16="http://schemas.microsoft.com/office/drawing/2014/main" id="{88D9AEDD-92B0-46B4-03A4-B195D717927E}"/>
               </a:ext>
             </a:extLst>
           </p:cNvPr>
@@ -2234,7 +2234,7 @@
           <p:cNvPr id="3" name="Рисунок 2">
             <a:extLst>
               <a:ext uri="{FF2B5EF4-FFF2-40B4-BE49-F238E27FC236}">
-                <a16:creationId xmlns:a16="http://schemas.microsoft.com/office/drawing/2014/main" id="{35ED409A-E729-F119-0DCF-0FB8E7857912}"/>
+                <a16:creationId xmlns:a16="http://schemas.microsoft.com/office/drawing/2014/main" id="{46A85078-B536-771F-35EF-6DE6B05B835F}"/>
               </a:ext>
             </a:extLst>
           </p:cNvPr>
@@ -2260,7 +2260,7 @@
     </p:spTree>
     <p:extLst>
       <p:ext uri="{BB962C8B-B14F-4D97-AF65-F5344CB8AC3E}">
-        <p14:creationId xmlns:p14="http://schemas.microsoft.com/office/powerpoint/2010/main" val="3072981780"/>
+        <p14:creationId xmlns:p14="http://schemas.microsoft.com/office/powerpoint/2010/main" val="2969775141"/>
       </p:ext>
     </p:extLst>
   </p:cSld>
@@ -2301,7 +2301,7 @@
           <p:cNvPr id="2" name="Заголовок 1" hidden="1">
             <a:extLst>
               <a:ext uri="{FF2B5EF4-FFF2-40B4-BE49-F238E27FC236}">
-                <a16:creationId xmlns:a16="http://schemas.microsoft.com/office/drawing/2014/main" id="{9B236474-A2E6-FF34-9531-670DAE934660}"/>
+                <a16:creationId xmlns:a16="http://schemas.microsoft.com/office/drawing/2014/main" id="{68FF5AC0-D2E1-F24B-D128-51ACE256F4FB}"/>
               </a:ext>
             </a:extLst>
           </p:cNvPr>
@@ -2343,7 +2343,7 @@
           <p:cNvPr id="3" name="Рисунок 2">
             <a:extLst>
               <a:ext uri="{FF2B5EF4-FFF2-40B4-BE49-F238E27FC236}">
-                <a16:creationId xmlns:a16="http://schemas.microsoft.com/office/drawing/2014/main" id="{B1098B9E-05FA-7FA5-2538-0CA720AA885A}"/>
+                <a16:creationId xmlns:a16="http://schemas.microsoft.com/office/drawing/2014/main" id="{9B046102-6954-81A4-0D4A-277245CA369B}"/>
               </a:ext>
             </a:extLst>
           </p:cNvPr>
@@ -2369,7 +2369,7 @@
     </p:spTree>
     <p:extLst>
       <p:ext uri="{BB962C8B-B14F-4D97-AF65-F5344CB8AC3E}">
-        <p14:creationId xmlns:p14="http://schemas.microsoft.com/office/powerpoint/2010/main" val="4209703857"/>
+        <p14:creationId xmlns:p14="http://schemas.microsoft.com/office/powerpoint/2010/main" val="1436777214"/>
       </p:ext>
     </p:extLst>
   </p:cSld>
@@ -2410,7 +2410,7 @@
           <p:cNvPr id="2" name="Заголовок 1" hidden="1">
             <a:extLst>
               <a:ext uri="{FF2B5EF4-FFF2-40B4-BE49-F238E27FC236}">
-                <a16:creationId xmlns:a16="http://schemas.microsoft.com/office/drawing/2014/main" id="{8C954A02-8BB1-830C-E808-88B52F9144EC}"/>
+                <a16:creationId xmlns:a16="http://schemas.microsoft.com/office/drawing/2014/main" id="{522EE68D-47F8-73D5-6632-CA8614A3747D}"/>
               </a:ext>
             </a:extLst>
           </p:cNvPr>
@@ -2452,7 +2452,7 @@
           <p:cNvPr id="3" name="Рисунок 2">
             <a:extLst>
               <a:ext uri="{FF2B5EF4-FFF2-40B4-BE49-F238E27FC236}">
-                <a16:creationId xmlns:a16="http://schemas.microsoft.com/office/drawing/2014/main" id="{B6E85ED3-1D93-929C-D404-78356A44C547}"/>
+                <a16:creationId xmlns:a16="http://schemas.microsoft.com/office/drawing/2014/main" id="{11BA8A41-709B-4B0C-46C8-C5B1D7977288}"/>
               </a:ext>
             </a:extLst>
           </p:cNvPr>
@@ -2478,7 +2478,7 @@
     </p:spTree>
     <p:extLst>
       <p:ext uri="{BB962C8B-B14F-4D97-AF65-F5344CB8AC3E}">
-        <p14:creationId xmlns:p14="http://schemas.microsoft.com/office/powerpoint/2010/main" val="962016483"/>
+        <p14:creationId xmlns:p14="http://schemas.microsoft.com/office/powerpoint/2010/main" val="2061230829"/>
       </p:ext>
     </p:extLst>
   </p:cSld>
@@ -2519,7 +2519,7 @@
           <p:cNvPr id="2" name="Заголовок 1" hidden="1">
             <a:extLst>
               <a:ext uri="{FF2B5EF4-FFF2-40B4-BE49-F238E27FC236}">
-                <a16:creationId xmlns:a16="http://schemas.microsoft.com/office/drawing/2014/main" id="{9CB65DC1-2857-C215-D1BE-6252764BDCC7}"/>
+                <a16:creationId xmlns:a16="http://schemas.microsoft.com/office/drawing/2014/main" id="{61F6101E-EF6D-5822-C8DF-DDB109C88BD1}"/>
               </a:ext>
             </a:extLst>
           </p:cNvPr>
@@ -2561,7 +2561,7 @@
           <p:cNvPr id="3" name="Рисунок 2">
             <a:extLst>
               <a:ext uri="{FF2B5EF4-FFF2-40B4-BE49-F238E27FC236}">
-                <a16:creationId xmlns:a16="http://schemas.microsoft.com/office/drawing/2014/main" id="{13B40EE1-104F-5193-1A9E-BD49042ED6CB}"/>
+                <a16:creationId xmlns:a16="http://schemas.microsoft.com/office/drawing/2014/main" id="{A56B21C1-3193-F0EB-00DA-C97369B85CCF}"/>
               </a:ext>
             </a:extLst>
           </p:cNvPr>
@@ -2587,7 +2587,7 @@
     </p:spTree>
     <p:extLst>
       <p:ext uri="{BB962C8B-B14F-4D97-AF65-F5344CB8AC3E}">
-        <p14:creationId xmlns:p14="http://schemas.microsoft.com/office/powerpoint/2010/main" val="4125241372"/>
+        <p14:creationId xmlns:p14="http://schemas.microsoft.com/office/powerpoint/2010/main" val="2229080205"/>
       </p:ext>
     </p:extLst>
   </p:cSld>
@@ -2628,7 +2628,7 @@
           <p:cNvPr id="2" name="Заголовок 1" hidden="1">
             <a:extLst>
               <a:ext uri="{FF2B5EF4-FFF2-40B4-BE49-F238E27FC236}">
-                <a16:creationId xmlns:a16="http://schemas.microsoft.com/office/drawing/2014/main" id="{1D450E72-5709-3357-F5C8-0CB56934071C}"/>
+                <a16:creationId xmlns:a16="http://schemas.microsoft.com/office/drawing/2014/main" id="{FE4BBAF6-8631-6CA5-F8DA-4B0CD1C2E713}"/>
               </a:ext>
             </a:extLst>
           </p:cNvPr>
@@ -2670,7 +2670,7 @@
           <p:cNvPr id="3" name="Рисунок 2">
             <a:extLst>
               <a:ext uri="{FF2B5EF4-FFF2-40B4-BE49-F238E27FC236}">
-                <a16:creationId xmlns:a16="http://schemas.microsoft.com/office/drawing/2014/main" id="{6E237297-7E85-C8A1-0F15-4F4882E4A0A5}"/>
+                <a16:creationId xmlns:a16="http://schemas.microsoft.com/office/drawing/2014/main" id="{62597CE6-C611-5220-C2C4-A9DCCB48F936}"/>
               </a:ext>
             </a:extLst>
           </p:cNvPr>
@@ -2696,7 +2696,7 @@
     </p:spTree>
     <p:extLst>
       <p:ext uri="{BB962C8B-B14F-4D97-AF65-F5344CB8AC3E}">
-        <p14:creationId xmlns:p14="http://schemas.microsoft.com/office/powerpoint/2010/main" val="1621980541"/>
+        <p14:creationId xmlns:p14="http://schemas.microsoft.com/office/powerpoint/2010/main" val="1586022464"/>
       </p:ext>
     </p:extLst>
   </p:cSld>
@@ -2737,7 +2737,7 @@
           <p:cNvPr id="2" name="Заголовок 1" hidden="1">
             <a:extLst>
               <a:ext uri="{FF2B5EF4-FFF2-40B4-BE49-F238E27FC236}">
-                <a16:creationId xmlns:a16="http://schemas.microsoft.com/office/drawing/2014/main" id="{02E4BE0F-FE3B-8324-23D0-16135256CBF5}"/>
+                <a16:creationId xmlns:a16="http://schemas.microsoft.com/office/drawing/2014/main" id="{E3C20BD9-6CE6-A254-40FF-8CA573EED86F}"/>
               </a:ext>
             </a:extLst>
           </p:cNvPr>
@@ -2771,7 +2771,7 @@
           <p:cNvPr id="3" name="Рисунок 2">
             <a:extLst>
               <a:ext uri="{FF2B5EF4-FFF2-40B4-BE49-F238E27FC236}">
-                <a16:creationId xmlns:a16="http://schemas.microsoft.com/office/drawing/2014/main" id="{324A1683-3537-49D9-D332-CC019B87C224}"/>
+                <a16:creationId xmlns:a16="http://schemas.microsoft.com/office/drawing/2014/main" id="{0DA7C4D4-BD14-F807-A480-8598E62E9A22}"/>
               </a:ext>
             </a:extLst>
           </p:cNvPr>
@@ -2797,7 +2797,7 @@
     </p:spTree>
     <p:extLst>
       <p:ext uri="{BB962C8B-B14F-4D97-AF65-F5344CB8AC3E}">
-        <p14:creationId xmlns:p14="http://schemas.microsoft.com/office/powerpoint/2010/main" val="1626551865"/>
+        <p14:creationId xmlns:p14="http://schemas.microsoft.com/office/powerpoint/2010/main" val="2000263839"/>
       </p:ext>
     </p:extLst>
   </p:cSld>
@@ -2838,7 +2838,7 @@
           <p:cNvPr id="2" name="Заголовок 1" hidden="1">
             <a:extLst>
               <a:ext uri="{FF2B5EF4-FFF2-40B4-BE49-F238E27FC236}">
-                <a16:creationId xmlns:a16="http://schemas.microsoft.com/office/drawing/2014/main" id="{FC5E6764-B820-DD3F-1457-EF884467582B}"/>
+                <a16:creationId xmlns:a16="http://schemas.microsoft.com/office/drawing/2014/main" id="{841B5209-3081-0CAE-DCB3-61846ABE465C}"/>
               </a:ext>
             </a:extLst>
           </p:cNvPr>
@@ -2863,7 +2863,7 @@
           <p:cNvPr id="3" name="Рисунок 2">
             <a:extLst>
               <a:ext uri="{FF2B5EF4-FFF2-40B4-BE49-F238E27FC236}">
-                <a16:creationId xmlns:a16="http://schemas.microsoft.com/office/drawing/2014/main" id="{BC5830A8-768F-39C6-00D8-579CDB858D49}"/>
+                <a16:creationId xmlns:a16="http://schemas.microsoft.com/office/drawing/2014/main" id="{C4C2D896-140E-C591-2C74-9C6DC43AE944}"/>
               </a:ext>
             </a:extLst>
           </p:cNvPr>
@@ -2889,7 +2889,7 @@
     </p:spTree>
     <p:extLst>
       <p:ext uri="{BB962C8B-B14F-4D97-AF65-F5344CB8AC3E}">
-        <p14:creationId xmlns:p14="http://schemas.microsoft.com/office/powerpoint/2010/main" val="2486591522"/>
+        <p14:creationId xmlns:p14="http://schemas.microsoft.com/office/powerpoint/2010/main" val="2177674072"/>
       </p:ext>
     </p:extLst>
   </p:cSld>

</xml_diff>

<commit_message>
Minor changes in slides
</commit_message>
<xml_diff>
--- a/slides/compatibility/Non_editable_slides.pptx
+++ b/slides/compatibility/Non_editable_slides.pptx
@@ -25,6 +25,7 @@
     <p:sldId id="273" r:id="rId19"/>
     <p:sldId id="274" r:id="rId20"/>
     <p:sldId id="275" r:id="rId21"/>
+    <p:sldId id="276" r:id="rId22"/>
   </p:sldIdLst>
   <p:sldSz cx="9144000" cy="5143500" type="screen16x9"/>
   <p:notesSz cx="6858000" cy="9144000"/>
@@ -148,7 +149,7 @@
           <p:cNvPr id="2" name="Заголовок 1">
             <a:extLst>
               <a:ext uri="{FF2B5EF4-FFF2-40B4-BE49-F238E27FC236}">
-                <a16:creationId xmlns:a16="http://schemas.microsoft.com/office/drawing/2014/main" id="{0C57BA21-2440-7C9B-07E0-F08C74A521BD}"/>
+                <a16:creationId xmlns:a16="http://schemas.microsoft.com/office/drawing/2014/main" id="{90A0BF92-7E7A-08A1-349E-A35A9790FA70}"/>
               </a:ext>
             </a:extLst>
           </p:cNvPr>
@@ -176,7 +177,7 @@
           <p:cNvPr id="3" name="Дата 2">
             <a:extLst>
               <a:ext uri="{FF2B5EF4-FFF2-40B4-BE49-F238E27FC236}">
-                <a16:creationId xmlns:a16="http://schemas.microsoft.com/office/drawing/2014/main" id="{0798C962-8ED5-17FF-6E6D-5F9A4AE5D714}"/>
+                <a16:creationId xmlns:a16="http://schemas.microsoft.com/office/drawing/2014/main" id="{6E6218BF-45DB-DF9B-46FF-C05D630D55CD}"/>
               </a:ext>
             </a:extLst>
           </p:cNvPr>
@@ -192,9 +193,9 @@
           <a:bodyPr/>
           <a:lstStyle/>
           <a:p>
-            <a:fld id="{A19F129E-53C4-4FDD-860B-958B4B66090E}" type="datetimeFigureOut">
+            <a:fld id="{1E0356DB-5892-42F7-A7F6-70DF9F3B90D8}" type="datetimeFigureOut">
               <a:rPr lang="ru-RU" smtClean="0"/>
-              <a:t>20.01.2026</a:t>
+              <a:t>21.01.2026</a:t>
             </a:fld>
             <a:endParaRPr lang="ru-RU"/>
           </a:p>
@@ -205,7 +206,7 @@
           <p:cNvPr id="4" name="Нижний колонтитул 3">
             <a:extLst>
               <a:ext uri="{FF2B5EF4-FFF2-40B4-BE49-F238E27FC236}">
-                <a16:creationId xmlns:a16="http://schemas.microsoft.com/office/drawing/2014/main" id="{AFB238A4-BA4D-CA1A-9231-6E7785156BAB}"/>
+                <a16:creationId xmlns:a16="http://schemas.microsoft.com/office/drawing/2014/main" id="{6854FC9E-23EA-978B-99C5-8DB19D62429F}"/>
               </a:ext>
             </a:extLst>
           </p:cNvPr>
@@ -230,7 +231,7 @@
           <p:cNvPr id="5" name="Номер слайда 4">
             <a:extLst>
               <a:ext uri="{FF2B5EF4-FFF2-40B4-BE49-F238E27FC236}">
-                <a16:creationId xmlns:a16="http://schemas.microsoft.com/office/drawing/2014/main" id="{5185ACD2-F01E-6DF2-3728-3D3DD7654487}"/>
+                <a16:creationId xmlns:a16="http://schemas.microsoft.com/office/drawing/2014/main" id="{1683CCCD-60B8-6160-3D62-16362E8EB97E}"/>
               </a:ext>
             </a:extLst>
           </p:cNvPr>
@@ -246,7 +247,7 @@
           <a:bodyPr/>
           <a:lstStyle/>
           <a:p>
-            <a:fld id="{3F47B613-F22A-42B8-B2C2-65D232F7D5FE}" type="slidenum">
+            <a:fld id="{EA207693-922C-4A3E-8711-4343FF37A325}" type="slidenum">
               <a:rPr lang="ru-RU" smtClean="0"/>
               <a:t>‹#›</a:t>
             </a:fld>
@@ -257,7 +258,7 @@
     </p:spTree>
     <p:extLst>
       <p:ext uri="{BB962C8B-B14F-4D97-AF65-F5344CB8AC3E}">
-        <p14:creationId xmlns:p14="http://schemas.microsoft.com/office/powerpoint/2010/main" val="3540872543"/>
+        <p14:creationId xmlns:p14="http://schemas.microsoft.com/office/powerpoint/2010/main" val="113308083"/>
       </p:ext>
     </p:extLst>
   </p:cSld>
@@ -294,7 +295,7 @@
           <p:cNvPr id="2" name="Заголовок 1">
             <a:extLst>
               <a:ext uri="{FF2B5EF4-FFF2-40B4-BE49-F238E27FC236}">
-                <a16:creationId xmlns:a16="http://schemas.microsoft.com/office/drawing/2014/main" id="{93AF2610-4BBA-C82B-69BD-28E283F69F1E}"/>
+                <a16:creationId xmlns:a16="http://schemas.microsoft.com/office/drawing/2014/main" id="{BEE0F46C-DE3F-33EA-97EF-6334107CDCBD}"/>
               </a:ext>
             </a:extLst>
           </p:cNvPr>
@@ -332,7 +333,7 @@
           <p:cNvPr id="3" name="Текст 2">
             <a:extLst>
               <a:ext uri="{FF2B5EF4-FFF2-40B4-BE49-F238E27FC236}">
-                <a16:creationId xmlns:a16="http://schemas.microsoft.com/office/drawing/2014/main" id="{F8337587-3540-4A9E-06BF-CD7299CF635F}"/>
+                <a16:creationId xmlns:a16="http://schemas.microsoft.com/office/drawing/2014/main" id="{78B56E79-DA30-A38E-332C-F0FC695AC88A}"/>
               </a:ext>
             </a:extLst>
           </p:cNvPr>
@@ -399,7 +400,7 @@
           <p:cNvPr id="4" name="Дата 3">
             <a:extLst>
               <a:ext uri="{FF2B5EF4-FFF2-40B4-BE49-F238E27FC236}">
-                <a16:creationId xmlns:a16="http://schemas.microsoft.com/office/drawing/2014/main" id="{7D8FEF98-37A6-B32A-9528-60A88DBA2D53}"/>
+                <a16:creationId xmlns:a16="http://schemas.microsoft.com/office/drawing/2014/main" id="{9F806665-81F1-F953-6776-2B9B5E7ABEBF}"/>
               </a:ext>
             </a:extLst>
           </p:cNvPr>
@@ -433,9 +434,9 @@
             </a:lvl1pPr>
           </a:lstStyle>
           <a:p>
-            <a:fld id="{A19F129E-53C4-4FDD-860B-958B4B66090E}" type="datetimeFigureOut">
+            <a:fld id="{1E0356DB-5892-42F7-A7F6-70DF9F3B90D8}" type="datetimeFigureOut">
               <a:rPr lang="ru-RU" smtClean="0"/>
-              <a:t>20.01.2026</a:t>
+              <a:t>21.01.2026</a:t>
             </a:fld>
             <a:endParaRPr lang="ru-RU"/>
           </a:p>
@@ -446,7 +447,7 @@
           <p:cNvPr id="5" name="Нижний колонтитул 4">
             <a:extLst>
               <a:ext uri="{FF2B5EF4-FFF2-40B4-BE49-F238E27FC236}">
-                <a16:creationId xmlns:a16="http://schemas.microsoft.com/office/drawing/2014/main" id="{B894395A-5C66-2479-784B-A71D3CA8AA9E}"/>
+                <a16:creationId xmlns:a16="http://schemas.microsoft.com/office/drawing/2014/main" id="{7B383F1A-20ED-C920-3264-589E860258D4}"/>
               </a:ext>
             </a:extLst>
           </p:cNvPr>
@@ -489,7 +490,7 @@
           <p:cNvPr id="6" name="Номер слайда 5">
             <a:extLst>
               <a:ext uri="{FF2B5EF4-FFF2-40B4-BE49-F238E27FC236}">
-                <a16:creationId xmlns:a16="http://schemas.microsoft.com/office/drawing/2014/main" id="{D6140CF4-E54F-ED9F-64DF-35F03348B2BB}"/>
+                <a16:creationId xmlns:a16="http://schemas.microsoft.com/office/drawing/2014/main" id="{518151AB-829B-DCC1-99F6-236566D110E1}"/>
               </a:ext>
             </a:extLst>
           </p:cNvPr>
@@ -523,7 +524,7 @@
             </a:lvl1pPr>
           </a:lstStyle>
           <a:p>
-            <a:fld id="{3F47B613-F22A-42B8-B2C2-65D232F7D5FE}" type="slidenum">
+            <a:fld id="{EA207693-922C-4A3E-8711-4343FF37A325}" type="slidenum">
               <a:rPr lang="ru-RU" smtClean="0"/>
               <a:t>‹#›</a:t>
             </a:fld>
@@ -534,7 +535,7 @@
     </p:spTree>
     <p:extLst>
       <p:ext uri="{BB962C8B-B14F-4D97-AF65-F5344CB8AC3E}">
-        <p14:creationId xmlns:p14="http://schemas.microsoft.com/office/powerpoint/2010/main" val="2930094068"/>
+        <p14:creationId xmlns:p14="http://schemas.microsoft.com/office/powerpoint/2010/main" val="2782672875"/>
       </p:ext>
     </p:extLst>
   </p:cSld>
@@ -853,7 +854,7 @@
           <p:cNvPr id="2" name="Заголовок 1" hidden="1">
             <a:extLst>
               <a:ext uri="{FF2B5EF4-FFF2-40B4-BE49-F238E27FC236}">
-                <a16:creationId xmlns:a16="http://schemas.microsoft.com/office/drawing/2014/main" id="{F6C20589-3AB8-6A5E-B534-1243046915C6}"/>
+                <a16:creationId xmlns:a16="http://schemas.microsoft.com/office/drawing/2014/main" id="{313C8A0C-5747-49F3-976E-091BE473F007}"/>
               </a:ext>
             </a:extLst>
           </p:cNvPr>
@@ -895,7 +896,7 @@
           <p:cNvPr id="3" name="Рисунок 2">
             <a:extLst>
               <a:ext uri="{FF2B5EF4-FFF2-40B4-BE49-F238E27FC236}">
-                <a16:creationId xmlns:a16="http://schemas.microsoft.com/office/drawing/2014/main" id="{123E17F9-BF24-2A61-0544-2D655980DF4E}"/>
+                <a16:creationId xmlns:a16="http://schemas.microsoft.com/office/drawing/2014/main" id="{19102E8D-6B95-4A9D-B514-52B1FA0FD9EB}"/>
               </a:ext>
             </a:extLst>
           </p:cNvPr>
@@ -921,7 +922,7 @@
     </p:spTree>
     <p:extLst>
       <p:ext uri="{BB962C8B-B14F-4D97-AF65-F5344CB8AC3E}">
-        <p14:creationId xmlns:p14="http://schemas.microsoft.com/office/powerpoint/2010/main" val="1881428580"/>
+        <p14:creationId xmlns:p14="http://schemas.microsoft.com/office/powerpoint/2010/main" val="3385000905"/>
       </p:ext>
     </p:extLst>
   </p:cSld>
@@ -962,7 +963,7 @@
           <p:cNvPr id="2" name="Заголовок 1" hidden="1">
             <a:extLst>
               <a:ext uri="{FF2B5EF4-FFF2-40B4-BE49-F238E27FC236}">
-                <a16:creationId xmlns:a16="http://schemas.microsoft.com/office/drawing/2014/main" id="{5446445A-2FD6-37A7-7E0E-847D541F5A0C}"/>
+                <a16:creationId xmlns:a16="http://schemas.microsoft.com/office/drawing/2014/main" id="{334C4E08-8874-50BC-85DF-7DD3D20DEB5A}"/>
               </a:ext>
             </a:extLst>
           </p:cNvPr>
@@ -987,7 +988,7 @@
           <p:cNvPr id="3" name="Рисунок 2">
             <a:extLst>
               <a:ext uri="{FF2B5EF4-FFF2-40B4-BE49-F238E27FC236}">
-                <a16:creationId xmlns:a16="http://schemas.microsoft.com/office/drawing/2014/main" id="{83C7B121-746E-64A3-37C0-3944915FF7F1}"/>
+                <a16:creationId xmlns:a16="http://schemas.microsoft.com/office/drawing/2014/main" id="{536333C6-5892-8866-1CCB-FCBE9E59DDA9}"/>
               </a:ext>
             </a:extLst>
           </p:cNvPr>
@@ -1013,7 +1014,7 @@
     </p:spTree>
     <p:extLst>
       <p:ext uri="{BB962C8B-B14F-4D97-AF65-F5344CB8AC3E}">
-        <p14:creationId xmlns:p14="http://schemas.microsoft.com/office/powerpoint/2010/main" val="3933258246"/>
+        <p14:creationId xmlns:p14="http://schemas.microsoft.com/office/powerpoint/2010/main" val="1647062398"/>
       </p:ext>
     </p:extLst>
   </p:cSld>
@@ -1054,7 +1055,7 @@
           <p:cNvPr id="2" name="Заголовок 1" hidden="1">
             <a:extLst>
               <a:ext uri="{FF2B5EF4-FFF2-40B4-BE49-F238E27FC236}">
-                <a16:creationId xmlns:a16="http://schemas.microsoft.com/office/drawing/2014/main" id="{CA782CFA-9EA5-8217-3277-321CD4563F58}"/>
+                <a16:creationId xmlns:a16="http://schemas.microsoft.com/office/drawing/2014/main" id="{A9EFFABC-07AD-2F85-49CD-D51E6654422D}"/>
               </a:ext>
             </a:extLst>
           </p:cNvPr>
@@ -1079,7 +1080,7 @@
           <p:cNvPr id="3" name="Рисунок 2">
             <a:extLst>
               <a:ext uri="{FF2B5EF4-FFF2-40B4-BE49-F238E27FC236}">
-                <a16:creationId xmlns:a16="http://schemas.microsoft.com/office/drawing/2014/main" id="{0F3BC2BF-2B3F-7761-D69E-06BD9A9E05E7}"/>
+                <a16:creationId xmlns:a16="http://schemas.microsoft.com/office/drawing/2014/main" id="{AD7E4DDD-F051-45A0-4844-D13BF60DCB1C}"/>
               </a:ext>
             </a:extLst>
           </p:cNvPr>
@@ -1105,7 +1106,7 @@
     </p:spTree>
     <p:extLst>
       <p:ext uri="{BB962C8B-B14F-4D97-AF65-F5344CB8AC3E}">
-        <p14:creationId xmlns:p14="http://schemas.microsoft.com/office/powerpoint/2010/main" val="1823948890"/>
+        <p14:creationId xmlns:p14="http://schemas.microsoft.com/office/powerpoint/2010/main" val="3819457445"/>
       </p:ext>
     </p:extLst>
   </p:cSld>
@@ -1146,7 +1147,7 @@
           <p:cNvPr id="2" name="Заголовок 1" hidden="1">
             <a:extLst>
               <a:ext uri="{FF2B5EF4-FFF2-40B4-BE49-F238E27FC236}">
-                <a16:creationId xmlns:a16="http://schemas.microsoft.com/office/drawing/2014/main" id="{2BFD400B-C3DB-C371-9F8B-3388E93784A6}"/>
+                <a16:creationId xmlns:a16="http://schemas.microsoft.com/office/drawing/2014/main" id="{18AE9CFD-8B93-466C-8DCD-6E7EDAB3CEC1}"/>
               </a:ext>
             </a:extLst>
           </p:cNvPr>
@@ -1171,7 +1172,7 @@
           <p:cNvPr id="3" name="Рисунок 2">
             <a:extLst>
               <a:ext uri="{FF2B5EF4-FFF2-40B4-BE49-F238E27FC236}">
-                <a16:creationId xmlns:a16="http://schemas.microsoft.com/office/drawing/2014/main" id="{959BF4B4-DD62-7AA9-A87F-C5DC34621BDB}"/>
+                <a16:creationId xmlns:a16="http://schemas.microsoft.com/office/drawing/2014/main" id="{D49A8375-785A-1D30-4495-E8980614FB03}"/>
               </a:ext>
             </a:extLst>
           </p:cNvPr>
@@ -1197,7 +1198,7 @@
     </p:spTree>
     <p:extLst>
       <p:ext uri="{BB962C8B-B14F-4D97-AF65-F5344CB8AC3E}">
-        <p14:creationId xmlns:p14="http://schemas.microsoft.com/office/powerpoint/2010/main" val="1211221730"/>
+        <p14:creationId xmlns:p14="http://schemas.microsoft.com/office/powerpoint/2010/main" val="2478509266"/>
       </p:ext>
     </p:extLst>
   </p:cSld>
@@ -1247,7 +1248,7 @@
           <p:cNvPr id="2" name="Заголовок 1" hidden="1">
             <a:extLst>
               <a:ext uri="{FF2B5EF4-FFF2-40B4-BE49-F238E27FC236}">
-                <a16:creationId xmlns:a16="http://schemas.microsoft.com/office/drawing/2014/main" id="{89A5D42F-E131-4278-A4F3-C927236B7751}"/>
+                <a16:creationId xmlns:a16="http://schemas.microsoft.com/office/drawing/2014/main" id="{595E39B1-DBC6-A2C0-35F0-0F54BF2D11DC}"/>
               </a:ext>
             </a:extLst>
           </p:cNvPr>
@@ -1289,7 +1290,7 @@
           <p:cNvPr id="3" name="Рисунок 2">
             <a:extLst>
               <a:ext uri="{FF2B5EF4-FFF2-40B4-BE49-F238E27FC236}">
-                <a16:creationId xmlns:a16="http://schemas.microsoft.com/office/drawing/2014/main" id="{889AA4BD-4E7B-D5F3-1EFE-A0912FA685E5}"/>
+                <a16:creationId xmlns:a16="http://schemas.microsoft.com/office/drawing/2014/main" id="{ACF4DC62-E022-5CEA-0E4D-0AA0C387CD5B}"/>
               </a:ext>
             </a:extLst>
           </p:cNvPr>
@@ -1315,7 +1316,7 @@
     </p:spTree>
     <p:extLst>
       <p:ext uri="{BB962C8B-B14F-4D97-AF65-F5344CB8AC3E}">
-        <p14:creationId xmlns:p14="http://schemas.microsoft.com/office/powerpoint/2010/main" val="679370200"/>
+        <p14:creationId xmlns:p14="http://schemas.microsoft.com/office/powerpoint/2010/main" val="3183106134"/>
       </p:ext>
     </p:extLst>
   </p:cSld>
@@ -1356,7 +1357,7 @@
           <p:cNvPr id="2" name="Заголовок 1" hidden="1">
             <a:extLst>
               <a:ext uri="{FF2B5EF4-FFF2-40B4-BE49-F238E27FC236}">
-                <a16:creationId xmlns:a16="http://schemas.microsoft.com/office/drawing/2014/main" id="{3A6E2AE4-F706-4B0F-79BC-0E76148B0A3C}"/>
+                <a16:creationId xmlns:a16="http://schemas.microsoft.com/office/drawing/2014/main" id="{8AF1EC0E-0200-924A-C260-F723336019B3}"/>
               </a:ext>
             </a:extLst>
           </p:cNvPr>
@@ -1381,7 +1382,7 @@
           <p:cNvPr id="3" name="Рисунок 2">
             <a:extLst>
               <a:ext uri="{FF2B5EF4-FFF2-40B4-BE49-F238E27FC236}">
-                <a16:creationId xmlns:a16="http://schemas.microsoft.com/office/drawing/2014/main" id="{ABE81783-5625-ADCC-C40F-9DF97ADEEADE}"/>
+                <a16:creationId xmlns:a16="http://schemas.microsoft.com/office/drawing/2014/main" id="{91A4BF0C-8A01-B807-D872-4EB0E1F6134A}"/>
               </a:ext>
             </a:extLst>
           </p:cNvPr>
@@ -1407,7 +1408,7 @@
     </p:spTree>
     <p:extLst>
       <p:ext uri="{BB962C8B-B14F-4D97-AF65-F5344CB8AC3E}">
-        <p14:creationId xmlns:p14="http://schemas.microsoft.com/office/powerpoint/2010/main" val="911391747"/>
+        <p14:creationId xmlns:p14="http://schemas.microsoft.com/office/powerpoint/2010/main" val="2207445643"/>
       </p:ext>
     </p:extLst>
   </p:cSld>
@@ -1448,7 +1449,7 @@
           <p:cNvPr id="2" name="Заголовок 1" hidden="1">
             <a:extLst>
               <a:ext uri="{FF2B5EF4-FFF2-40B4-BE49-F238E27FC236}">
-                <a16:creationId xmlns:a16="http://schemas.microsoft.com/office/drawing/2014/main" id="{CAA09DF4-15C9-B097-D667-5875EDC06824}"/>
+                <a16:creationId xmlns:a16="http://schemas.microsoft.com/office/drawing/2014/main" id="{DB4664BA-335B-884A-E862-91DF0C3FF6E5}"/>
               </a:ext>
             </a:extLst>
           </p:cNvPr>
@@ -1482,7 +1483,7 @@
           <p:cNvPr id="3" name="Рисунок 2">
             <a:extLst>
               <a:ext uri="{FF2B5EF4-FFF2-40B4-BE49-F238E27FC236}">
-                <a16:creationId xmlns:a16="http://schemas.microsoft.com/office/drawing/2014/main" id="{87A4786F-AD35-CA26-7FCD-520AF58E6DF5}"/>
+                <a16:creationId xmlns:a16="http://schemas.microsoft.com/office/drawing/2014/main" id="{89B98D30-9B01-7CFC-255D-91576C8AC3EE}"/>
               </a:ext>
             </a:extLst>
           </p:cNvPr>
@@ -1508,7 +1509,7 @@
     </p:spTree>
     <p:extLst>
       <p:ext uri="{BB962C8B-B14F-4D97-AF65-F5344CB8AC3E}">
-        <p14:creationId xmlns:p14="http://schemas.microsoft.com/office/powerpoint/2010/main" val="3737048922"/>
+        <p14:creationId xmlns:p14="http://schemas.microsoft.com/office/powerpoint/2010/main" val="192574116"/>
       </p:ext>
     </p:extLst>
   </p:cSld>
@@ -1549,7 +1550,7 @@
           <p:cNvPr id="2" name="Заголовок 1" hidden="1">
             <a:extLst>
               <a:ext uri="{FF2B5EF4-FFF2-40B4-BE49-F238E27FC236}">
-                <a16:creationId xmlns:a16="http://schemas.microsoft.com/office/drawing/2014/main" id="{AF36C6C3-1164-1B05-14D7-F946BE410100}"/>
+                <a16:creationId xmlns:a16="http://schemas.microsoft.com/office/drawing/2014/main" id="{A1DBD103-50E0-0838-AD58-C9DE11701938}"/>
               </a:ext>
             </a:extLst>
           </p:cNvPr>
@@ -1581,7 +1582,7 @@
               <a:rPr lang="ru-RU" sz="4800">
                 <a:latin typeface="Montserrat Medium" panose="00000600000000000000" pitchFamily="2" charset="-52"/>
               </a:rPr>
-              <a:t>19.65 км</a:t>
+              <a:t>3.9 км</a:t>
             </a:r>
             <a:br>
               <a:rPr lang="ru-RU" sz="4800">
@@ -1592,10 +1593,16 @@
               <a:rPr lang="ru-RU" sz="4800">
                 <a:latin typeface="Montserrat Medium" panose="00000600000000000000" pitchFamily="2" charset="-52"/>
               </a:rPr>
-              <a:t>Маршрут #40</a:t>
+              <a:t>Маршрут </a:t>
+            </a:r>
+            <a:r>
+              <a:rPr lang="ru-RU" sz="4800">
+                <a:latin typeface="Montserrat Black" panose="00000A00000000000000" pitchFamily="2" charset="-52"/>
+              </a:rPr>
+              <a:t>#62</a:t>
             </a:r>
             <a:endParaRPr lang="ru-RU" dirty="0">
-              <a:latin typeface="Montserrat Medium" panose="00000600000000000000" pitchFamily="2" charset="-52"/>
+              <a:latin typeface="Montserrat Black" panose="00000A00000000000000" pitchFamily="2" charset="-52"/>
             </a:endParaRPr>
           </a:p>
         </p:txBody>
@@ -1605,7 +1612,7 @@
           <p:cNvPr id="3" name="Рисунок 2">
             <a:extLst>
               <a:ext uri="{FF2B5EF4-FFF2-40B4-BE49-F238E27FC236}">
-                <a16:creationId xmlns:a16="http://schemas.microsoft.com/office/drawing/2014/main" id="{D8B8E01F-F247-3914-A718-2587B9EEB5F3}"/>
+                <a16:creationId xmlns:a16="http://schemas.microsoft.com/office/drawing/2014/main" id="{1449E16E-8C35-7E38-3283-D43C51995877}"/>
               </a:ext>
             </a:extLst>
           </p:cNvPr>
@@ -1631,7 +1638,7 @@
     </p:spTree>
     <p:extLst>
       <p:ext uri="{BB962C8B-B14F-4D97-AF65-F5344CB8AC3E}">
-        <p14:creationId xmlns:p14="http://schemas.microsoft.com/office/powerpoint/2010/main" val="1134773971"/>
+        <p14:creationId xmlns:p14="http://schemas.microsoft.com/office/powerpoint/2010/main" val="1156311097"/>
       </p:ext>
     </p:extLst>
   </p:cSld>
@@ -1672,7 +1679,7 @@
           <p:cNvPr id="2" name="Заголовок 1" hidden="1">
             <a:extLst>
               <a:ext uri="{FF2B5EF4-FFF2-40B4-BE49-F238E27FC236}">
-                <a16:creationId xmlns:a16="http://schemas.microsoft.com/office/drawing/2014/main" id="{13B3DA2D-7690-CFEB-55B8-7D511A04742E}"/>
+                <a16:creationId xmlns:a16="http://schemas.microsoft.com/office/drawing/2014/main" id="{82EFFDE4-A938-3583-71B9-9E9ED2E34AFE}"/>
               </a:ext>
             </a:extLst>
           </p:cNvPr>
@@ -1688,15 +1695,43 @@
           <a:bodyPr/>
           <a:lstStyle/>
           <a:p>
-            <a:pPr lvl="0"/>
+            <a:pPr lvl="0" algn="r"/>
             <a:r>
               <a:rPr lang="ru-RU">
                 <a:latin typeface="+mj-lt"/>
               </a:rPr>
-              <a:t>Связность сети</a:t>
+              <a:t>Длины маршрутов</a:t>
+            </a:r>
+            <a:br>
+              <a:rPr lang="ru-RU">
+                <a:latin typeface="+mj-lt"/>
+              </a:rPr>
+            </a:br>
+            <a:r>
+              <a:rPr lang="ru-RU" sz="4800">
+                <a:latin typeface="Montserrat Medium" panose="00000600000000000000" pitchFamily="2" charset="-52"/>
+              </a:rPr>
+              <a:t>19.65 км</a:t>
+            </a:r>
+            <a:br>
+              <a:rPr lang="ru-RU" sz="4800">
+                <a:latin typeface="Montserrat Medium" panose="00000600000000000000" pitchFamily="2" charset="-52"/>
+              </a:rPr>
+            </a:br>
+            <a:r>
+              <a:rPr lang="ru-RU" sz="4800">
+                <a:latin typeface="Montserrat Medium" panose="00000600000000000000" pitchFamily="2" charset="-52"/>
+              </a:rPr>
+              <a:t>Маршрут </a:t>
+            </a:r>
+            <a:r>
+              <a:rPr lang="ru-RU" sz="4800">
+                <a:latin typeface="Montserrat Black" panose="00000A00000000000000" pitchFamily="2" charset="-52"/>
+              </a:rPr>
+              <a:t>#40</a:t>
             </a:r>
             <a:endParaRPr lang="ru-RU" dirty="0">
-              <a:latin typeface="+mj-lt"/>
+              <a:latin typeface="Montserrat Black" panose="00000A00000000000000" pitchFamily="2" charset="-52"/>
             </a:endParaRPr>
           </a:p>
         </p:txBody>
@@ -1706,7 +1741,7 @@
           <p:cNvPr id="3" name="Рисунок 2">
             <a:extLst>
               <a:ext uri="{FF2B5EF4-FFF2-40B4-BE49-F238E27FC236}">
-                <a16:creationId xmlns:a16="http://schemas.microsoft.com/office/drawing/2014/main" id="{BCC86FD8-A534-D7FD-79A9-A3A9E0673365}"/>
+                <a16:creationId xmlns:a16="http://schemas.microsoft.com/office/drawing/2014/main" id="{EB8E2A65-768E-D36D-6722-F3756F2C52DD}"/>
               </a:ext>
             </a:extLst>
           </p:cNvPr>
@@ -1732,7 +1767,7 @@
     </p:spTree>
     <p:extLst>
       <p:ext uri="{BB962C8B-B14F-4D97-AF65-F5344CB8AC3E}">
-        <p14:creationId xmlns:p14="http://schemas.microsoft.com/office/powerpoint/2010/main" val="1312897552"/>
+        <p14:creationId xmlns:p14="http://schemas.microsoft.com/office/powerpoint/2010/main" val="2041838982"/>
       </p:ext>
     </p:extLst>
   </p:cSld>
@@ -1773,7 +1808,7 @@
           <p:cNvPr id="2" name="Заголовок 1" hidden="1">
             <a:extLst>
               <a:ext uri="{FF2B5EF4-FFF2-40B4-BE49-F238E27FC236}">
-                <a16:creationId xmlns:a16="http://schemas.microsoft.com/office/drawing/2014/main" id="{37C9398E-2764-526C-BD6D-8CA511DDDB58}"/>
+                <a16:creationId xmlns:a16="http://schemas.microsoft.com/office/drawing/2014/main" id="{83B2C0F5-609F-83F2-98C7-5E7ECD18BA9B}"/>
               </a:ext>
             </a:extLst>
           </p:cNvPr>
@@ -1789,7 +1824,16 @@
           <a:bodyPr/>
           <a:lstStyle/>
           <a:p>
-            <a:endParaRPr lang="ru-RU"/>
+            <a:pPr lvl="0"/>
+            <a:r>
+              <a:rPr lang="ru-RU">
+                <a:latin typeface="+mj-lt"/>
+              </a:rPr>
+              <a:t>Связность сети</a:t>
+            </a:r>
+            <a:endParaRPr lang="ru-RU" dirty="0">
+              <a:latin typeface="+mj-lt"/>
+            </a:endParaRPr>
           </a:p>
         </p:txBody>
       </p:sp>
@@ -1798,7 +1842,7 @@
           <p:cNvPr id="3" name="Рисунок 2">
             <a:extLst>
               <a:ext uri="{FF2B5EF4-FFF2-40B4-BE49-F238E27FC236}">
-                <a16:creationId xmlns:a16="http://schemas.microsoft.com/office/drawing/2014/main" id="{39EEDC42-6950-94D9-CE52-86E1D8487CEA}"/>
+                <a16:creationId xmlns:a16="http://schemas.microsoft.com/office/drawing/2014/main" id="{D78B0129-91DA-DC62-1EAE-A8248FD98E28}"/>
               </a:ext>
             </a:extLst>
           </p:cNvPr>
@@ -1824,25 +1868,16 @@
     </p:spTree>
     <p:extLst>
       <p:ext uri="{BB962C8B-B14F-4D97-AF65-F5344CB8AC3E}">
-        <p14:creationId xmlns:p14="http://schemas.microsoft.com/office/powerpoint/2010/main" val="549091284"/>
+        <p14:creationId xmlns:p14="http://schemas.microsoft.com/office/powerpoint/2010/main" val="692953975"/>
       </p:ext>
     </p:extLst>
   </p:cSld>
   <p:clrMapOvr>
     <a:masterClrMapping/>
   </p:clrMapOvr>
-  <mc:AlternateContent xmlns:mc="http://schemas.openxmlformats.org/markup-compatibility/2006" xmlns:p159="http://schemas.microsoft.com/office/powerpoint/2015/09/main">
-    <mc:Choice Requires="p159">
-      <p:transition spd="med">
-        <p159:morph option="byObject"/>
-      </p:transition>
-    </mc:Choice>
-    <mc:Fallback xmlns="">
-      <p:transition spd="med">
-        <p:fade/>
-      </p:transition>
-    </mc:Fallback>
-  </mc:AlternateContent>
+  <p:transition>
+    <p:push/>
+  </p:transition>
 </p:sld>
 </file>
 
@@ -1874,7 +1909,7 @@
           <p:cNvPr id="2" name="Заголовок 1" hidden="1">
             <a:extLst>
               <a:ext uri="{FF2B5EF4-FFF2-40B4-BE49-F238E27FC236}">
-                <a16:creationId xmlns:a16="http://schemas.microsoft.com/office/drawing/2014/main" id="{87B78FA6-3A3A-A683-025F-AEBEEF7F089B}"/>
+                <a16:creationId xmlns:a16="http://schemas.microsoft.com/office/drawing/2014/main" id="{B2C289B5-DA59-6246-8672-47372C1E4825}"/>
               </a:ext>
             </a:extLst>
           </p:cNvPr>
@@ -1890,15 +1925,7 @@
           <a:bodyPr/>
           <a:lstStyle/>
           <a:p>
-            <a:r>
-              <a:rPr lang="ru-RU" b="1">
-                <a:latin typeface="+mj-lt"/>
-              </a:rPr>
-              <a:t>Продукт проекта</a:t>
-            </a:r>
-            <a:endParaRPr lang="ru-RU" b="1" dirty="0">
-              <a:latin typeface="+mj-lt"/>
-            </a:endParaRPr>
+            <a:endParaRPr lang="ru-RU"/>
           </a:p>
         </p:txBody>
       </p:sp>
@@ -1907,7 +1934,7 @@
           <p:cNvPr id="3" name="Рисунок 2">
             <a:extLst>
               <a:ext uri="{FF2B5EF4-FFF2-40B4-BE49-F238E27FC236}">
-                <a16:creationId xmlns:a16="http://schemas.microsoft.com/office/drawing/2014/main" id="{8B61DC71-B831-21E3-A646-576F1007E628}"/>
+                <a16:creationId xmlns:a16="http://schemas.microsoft.com/office/drawing/2014/main" id="{16681EE2-8D62-058D-E454-2020FC1E6EA0}"/>
               </a:ext>
             </a:extLst>
           </p:cNvPr>
@@ -1933,16 +1960,25 @@
     </p:spTree>
     <p:extLst>
       <p:ext uri="{BB962C8B-B14F-4D97-AF65-F5344CB8AC3E}">
-        <p14:creationId xmlns:p14="http://schemas.microsoft.com/office/powerpoint/2010/main" val="4285659805"/>
+        <p14:creationId xmlns:p14="http://schemas.microsoft.com/office/powerpoint/2010/main" val="2709567185"/>
       </p:ext>
     </p:extLst>
   </p:cSld>
   <p:clrMapOvr>
     <a:masterClrMapping/>
   </p:clrMapOvr>
-  <p:transition>
-    <p:push dir="u"/>
-  </p:transition>
+  <mc:AlternateContent xmlns:mc="http://schemas.openxmlformats.org/markup-compatibility/2006" xmlns:p159="http://schemas.microsoft.com/office/powerpoint/2015/09/main">
+    <mc:Choice Requires="p159">
+      <p:transition spd="med">
+        <p159:morph option="byObject"/>
+      </p:transition>
+    </mc:Choice>
+    <mc:Fallback xmlns="">
+      <p:transition spd="med">
+        <p:fade/>
+      </p:transition>
+    </mc:Fallback>
+  </mc:AlternateContent>
 </p:sld>
 </file>
 
@@ -1974,7 +2010,7 @@
           <p:cNvPr id="2" name="Заголовок 1" hidden="1">
             <a:extLst>
               <a:ext uri="{FF2B5EF4-FFF2-40B4-BE49-F238E27FC236}">
-                <a16:creationId xmlns:a16="http://schemas.microsoft.com/office/drawing/2014/main" id="{7F3C3F52-E3DE-8582-969E-6B5BE5EDDB1C}"/>
+                <a16:creationId xmlns:a16="http://schemas.microsoft.com/office/drawing/2014/main" id="{73617656-5999-00EE-55C4-CB14D239A194}"/>
               </a:ext>
             </a:extLst>
           </p:cNvPr>
@@ -2016,7 +2052,7 @@
           <p:cNvPr id="3" name="Рисунок 2">
             <a:extLst>
               <a:ext uri="{FF2B5EF4-FFF2-40B4-BE49-F238E27FC236}">
-                <a16:creationId xmlns:a16="http://schemas.microsoft.com/office/drawing/2014/main" id="{2C59F066-9B6B-9EB0-7C17-207911DCFA92}"/>
+                <a16:creationId xmlns:a16="http://schemas.microsoft.com/office/drawing/2014/main" id="{5194A161-A74A-AF2F-0E85-9C12CF1547D2}"/>
               </a:ext>
             </a:extLst>
           </p:cNvPr>
@@ -2042,7 +2078,7 @@
     </p:spTree>
     <p:extLst>
       <p:ext uri="{BB962C8B-B14F-4D97-AF65-F5344CB8AC3E}">
-        <p14:creationId xmlns:p14="http://schemas.microsoft.com/office/powerpoint/2010/main" val="243597127"/>
+        <p14:creationId xmlns:p14="http://schemas.microsoft.com/office/powerpoint/2010/main" val="2935801125"/>
       </p:ext>
     </p:extLst>
   </p:cSld>
@@ -2083,7 +2119,107 @@
           <p:cNvPr id="2" name="Заголовок 1" hidden="1">
             <a:extLst>
               <a:ext uri="{FF2B5EF4-FFF2-40B4-BE49-F238E27FC236}">
-                <a16:creationId xmlns:a16="http://schemas.microsoft.com/office/drawing/2014/main" id="{02516CBC-33FC-5828-A440-2BCFA28CE603}"/>
+                <a16:creationId xmlns:a16="http://schemas.microsoft.com/office/drawing/2014/main" id="{DBA114A1-46D9-C493-9944-6D0C953D717F}"/>
+              </a:ext>
+            </a:extLst>
+          </p:cNvPr>
+          <p:cNvSpPr>
+            <a:spLocks noGrp="1"/>
+          </p:cNvSpPr>
+          <p:nvPr>
+            <p:ph type="title"/>
+          </p:nvPr>
+        </p:nvSpPr>
+        <p:spPr/>
+        <p:txBody>
+          <a:bodyPr/>
+          <a:lstStyle/>
+          <a:p>
+            <a:r>
+              <a:rPr lang="ru-RU" b="1">
+                <a:latin typeface="+mj-lt"/>
+              </a:rPr>
+              <a:t>Продукт проекта</a:t>
+            </a:r>
+            <a:endParaRPr lang="ru-RU" b="1" dirty="0">
+              <a:latin typeface="+mj-lt"/>
+            </a:endParaRPr>
+          </a:p>
+        </p:txBody>
+      </p:sp>
+      <p:pic>
+        <p:nvPicPr>
+          <p:cNvPr id="3" name="Рисунок 2">
+            <a:extLst>
+              <a:ext uri="{FF2B5EF4-FFF2-40B4-BE49-F238E27FC236}">
+                <a16:creationId xmlns:a16="http://schemas.microsoft.com/office/drawing/2014/main" id="{DBEAC808-2CB8-B3B3-B607-2AF4C7F2F993}"/>
+              </a:ext>
+            </a:extLst>
+          </p:cNvPr>
+          <p:cNvPicPr/>
+          <p:nvPr/>
+        </p:nvPicPr>
+        <p:blipFill>
+          <a:blip r:embed="rId2"/>
+          <a:stretch>
+            <a:fillRect/>
+          </a:stretch>
+        </p:blipFill>
+        <p:spPr>
+          <a:xfrm>
+            <a:off x="0" y="0"/>
+            <a:ext cx="9144000" cy="5143500"/>
+          </a:xfrm>
+          <a:prstGeom prst="rect">
+            <a:avLst/>
+          </a:prstGeom>
+        </p:spPr>
+      </p:pic>
+    </p:spTree>
+    <p:extLst>
+      <p:ext uri="{BB962C8B-B14F-4D97-AF65-F5344CB8AC3E}">
+        <p14:creationId xmlns:p14="http://schemas.microsoft.com/office/powerpoint/2010/main" val="2440835772"/>
+      </p:ext>
+    </p:extLst>
+  </p:cSld>
+  <p:clrMapOvr>
+    <a:masterClrMapping/>
+  </p:clrMapOvr>
+  <p:transition>
+    <p:push dir="u"/>
+  </p:transition>
+</p:sld>
+</file>
+
+<file path=ppt/slides/slide21.xml><?xml version="1.0" encoding="utf-8"?>
+<p:sld xmlns:a="http://schemas.openxmlformats.org/drawingml/2006/main" xmlns:r="http://schemas.openxmlformats.org/officeDocument/2006/relationships" xmlns:p="http://schemas.openxmlformats.org/presentationml/2006/main">
+  <p:cSld>
+    <p:bg>
+      <p:bgPr>
+        <a:noFill/>
+        <a:effectLst/>
+      </p:bgPr>
+    </p:bg>
+    <p:spTree>
+      <p:nvGrpSpPr>
+        <p:cNvPr id="1" name=""/>
+        <p:cNvGrpSpPr/>
+        <p:nvPr/>
+      </p:nvGrpSpPr>
+      <p:grpSpPr>
+        <a:xfrm>
+          <a:off x="0" y="0"/>
+          <a:ext cx="0" cy="0"/>
+          <a:chOff x="0" y="0"/>
+          <a:chExt cx="0" cy="0"/>
+        </a:xfrm>
+      </p:grpSpPr>
+      <p:sp>
+        <p:nvSpPr>
+          <p:cNvPr id="2" name="Заголовок 1" hidden="1">
+            <a:extLst>
+              <a:ext uri="{FF2B5EF4-FFF2-40B4-BE49-F238E27FC236}">
+                <a16:creationId xmlns:a16="http://schemas.microsoft.com/office/drawing/2014/main" id="{FEF4CADE-14F3-77EF-7959-CB273E4A6FFA}"/>
               </a:ext>
             </a:extLst>
           </p:cNvPr>
@@ -2125,7 +2261,7 @@
           <p:cNvPr id="3" name="Рисунок 2">
             <a:extLst>
               <a:ext uri="{FF2B5EF4-FFF2-40B4-BE49-F238E27FC236}">
-                <a16:creationId xmlns:a16="http://schemas.microsoft.com/office/drawing/2014/main" id="{0B535F7C-630A-950C-3DEA-1951F125E7E4}"/>
+                <a16:creationId xmlns:a16="http://schemas.microsoft.com/office/drawing/2014/main" id="{A065FDF7-486A-5419-7B38-6951AC8A8AD8}"/>
               </a:ext>
             </a:extLst>
           </p:cNvPr>
@@ -2151,7 +2287,7 @@
     </p:spTree>
     <p:extLst>
       <p:ext uri="{BB962C8B-B14F-4D97-AF65-F5344CB8AC3E}">
-        <p14:creationId xmlns:p14="http://schemas.microsoft.com/office/powerpoint/2010/main" val="160649651"/>
+        <p14:creationId xmlns:p14="http://schemas.microsoft.com/office/powerpoint/2010/main" val="1229145952"/>
       </p:ext>
     </p:extLst>
   </p:cSld>
@@ -2192,7 +2328,7 @@
           <p:cNvPr id="2" name="Заголовок 1" hidden="1">
             <a:extLst>
               <a:ext uri="{FF2B5EF4-FFF2-40B4-BE49-F238E27FC236}">
-                <a16:creationId xmlns:a16="http://schemas.microsoft.com/office/drawing/2014/main" id="{88D9AEDD-92B0-46B4-03A4-B195D717927E}"/>
+                <a16:creationId xmlns:a16="http://schemas.microsoft.com/office/drawing/2014/main" id="{2FEDE081-7ADB-1A1C-A0C8-552B0B3DD431}"/>
               </a:ext>
             </a:extLst>
           </p:cNvPr>
@@ -2234,7 +2370,7 @@
           <p:cNvPr id="3" name="Рисунок 2">
             <a:extLst>
               <a:ext uri="{FF2B5EF4-FFF2-40B4-BE49-F238E27FC236}">
-                <a16:creationId xmlns:a16="http://schemas.microsoft.com/office/drawing/2014/main" id="{46A85078-B536-771F-35EF-6DE6B05B835F}"/>
+                <a16:creationId xmlns:a16="http://schemas.microsoft.com/office/drawing/2014/main" id="{C1AAB8E5-F9CA-D173-3A90-0745F1DA6371}"/>
               </a:ext>
             </a:extLst>
           </p:cNvPr>
@@ -2260,7 +2396,7 @@
     </p:spTree>
     <p:extLst>
       <p:ext uri="{BB962C8B-B14F-4D97-AF65-F5344CB8AC3E}">
-        <p14:creationId xmlns:p14="http://schemas.microsoft.com/office/powerpoint/2010/main" val="2969775141"/>
+        <p14:creationId xmlns:p14="http://schemas.microsoft.com/office/powerpoint/2010/main" val="290562635"/>
       </p:ext>
     </p:extLst>
   </p:cSld>
@@ -2301,7 +2437,7 @@
           <p:cNvPr id="2" name="Заголовок 1" hidden="1">
             <a:extLst>
               <a:ext uri="{FF2B5EF4-FFF2-40B4-BE49-F238E27FC236}">
-                <a16:creationId xmlns:a16="http://schemas.microsoft.com/office/drawing/2014/main" id="{68FF5AC0-D2E1-F24B-D128-51ACE256F4FB}"/>
+                <a16:creationId xmlns:a16="http://schemas.microsoft.com/office/drawing/2014/main" id="{011C09F4-21ED-53A4-A260-75DF68FC0065}"/>
               </a:ext>
             </a:extLst>
           </p:cNvPr>
@@ -2343,7 +2479,7 @@
           <p:cNvPr id="3" name="Рисунок 2">
             <a:extLst>
               <a:ext uri="{FF2B5EF4-FFF2-40B4-BE49-F238E27FC236}">
-                <a16:creationId xmlns:a16="http://schemas.microsoft.com/office/drawing/2014/main" id="{9B046102-6954-81A4-0D4A-277245CA369B}"/>
+                <a16:creationId xmlns:a16="http://schemas.microsoft.com/office/drawing/2014/main" id="{95D4CD48-1924-4421-0DFB-0E9CBBDDFF60}"/>
               </a:ext>
             </a:extLst>
           </p:cNvPr>
@@ -2369,7 +2505,7 @@
     </p:spTree>
     <p:extLst>
       <p:ext uri="{BB962C8B-B14F-4D97-AF65-F5344CB8AC3E}">
-        <p14:creationId xmlns:p14="http://schemas.microsoft.com/office/powerpoint/2010/main" val="1436777214"/>
+        <p14:creationId xmlns:p14="http://schemas.microsoft.com/office/powerpoint/2010/main" val="440696080"/>
       </p:ext>
     </p:extLst>
   </p:cSld>
@@ -2410,7 +2546,7 @@
           <p:cNvPr id="2" name="Заголовок 1" hidden="1">
             <a:extLst>
               <a:ext uri="{FF2B5EF4-FFF2-40B4-BE49-F238E27FC236}">
-                <a16:creationId xmlns:a16="http://schemas.microsoft.com/office/drawing/2014/main" id="{522EE68D-47F8-73D5-6632-CA8614A3747D}"/>
+                <a16:creationId xmlns:a16="http://schemas.microsoft.com/office/drawing/2014/main" id="{9523C6D1-0199-26CD-EBB5-F538F971517C}"/>
               </a:ext>
             </a:extLst>
           </p:cNvPr>
@@ -2452,7 +2588,7 @@
           <p:cNvPr id="3" name="Рисунок 2">
             <a:extLst>
               <a:ext uri="{FF2B5EF4-FFF2-40B4-BE49-F238E27FC236}">
-                <a16:creationId xmlns:a16="http://schemas.microsoft.com/office/drawing/2014/main" id="{11BA8A41-709B-4B0C-46C8-C5B1D7977288}"/>
+                <a16:creationId xmlns:a16="http://schemas.microsoft.com/office/drawing/2014/main" id="{4E248299-B36C-E603-B9D7-CCA64C6CD53E}"/>
               </a:ext>
             </a:extLst>
           </p:cNvPr>
@@ -2478,7 +2614,7 @@
     </p:spTree>
     <p:extLst>
       <p:ext uri="{BB962C8B-B14F-4D97-AF65-F5344CB8AC3E}">
-        <p14:creationId xmlns:p14="http://schemas.microsoft.com/office/powerpoint/2010/main" val="2061230829"/>
+        <p14:creationId xmlns:p14="http://schemas.microsoft.com/office/powerpoint/2010/main" val="484029370"/>
       </p:ext>
     </p:extLst>
   </p:cSld>
@@ -2519,7 +2655,7 @@
           <p:cNvPr id="2" name="Заголовок 1" hidden="1">
             <a:extLst>
               <a:ext uri="{FF2B5EF4-FFF2-40B4-BE49-F238E27FC236}">
-                <a16:creationId xmlns:a16="http://schemas.microsoft.com/office/drawing/2014/main" id="{61F6101E-EF6D-5822-C8DF-DDB109C88BD1}"/>
+                <a16:creationId xmlns:a16="http://schemas.microsoft.com/office/drawing/2014/main" id="{263889E5-2387-2567-2503-964014C0C9B5}"/>
               </a:ext>
             </a:extLst>
           </p:cNvPr>
@@ -2561,7 +2697,7 @@
           <p:cNvPr id="3" name="Рисунок 2">
             <a:extLst>
               <a:ext uri="{FF2B5EF4-FFF2-40B4-BE49-F238E27FC236}">
-                <a16:creationId xmlns:a16="http://schemas.microsoft.com/office/drawing/2014/main" id="{A56B21C1-3193-F0EB-00DA-C97369B85CCF}"/>
+                <a16:creationId xmlns:a16="http://schemas.microsoft.com/office/drawing/2014/main" id="{AA38B2AE-A9A2-E54B-11D0-4E0D6318C555}"/>
               </a:ext>
             </a:extLst>
           </p:cNvPr>
@@ -2587,7 +2723,7 @@
     </p:spTree>
     <p:extLst>
       <p:ext uri="{BB962C8B-B14F-4D97-AF65-F5344CB8AC3E}">
-        <p14:creationId xmlns:p14="http://schemas.microsoft.com/office/powerpoint/2010/main" val="2229080205"/>
+        <p14:creationId xmlns:p14="http://schemas.microsoft.com/office/powerpoint/2010/main" val="638950884"/>
       </p:ext>
     </p:extLst>
   </p:cSld>
@@ -2628,7 +2764,7 @@
           <p:cNvPr id="2" name="Заголовок 1" hidden="1">
             <a:extLst>
               <a:ext uri="{FF2B5EF4-FFF2-40B4-BE49-F238E27FC236}">
-                <a16:creationId xmlns:a16="http://schemas.microsoft.com/office/drawing/2014/main" id="{FE4BBAF6-8631-6CA5-F8DA-4B0CD1C2E713}"/>
+                <a16:creationId xmlns:a16="http://schemas.microsoft.com/office/drawing/2014/main" id="{5446D29D-C34C-C9C3-8A2A-3C367CB2BF31}"/>
               </a:ext>
             </a:extLst>
           </p:cNvPr>
@@ -2670,7 +2806,7 @@
           <p:cNvPr id="3" name="Рисунок 2">
             <a:extLst>
               <a:ext uri="{FF2B5EF4-FFF2-40B4-BE49-F238E27FC236}">
-                <a16:creationId xmlns:a16="http://schemas.microsoft.com/office/drawing/2014/main" id="{62597CE6-C611-5220-C2C4-A9DCCB48F936}"/>
+                <a16:creationId xmlns:a16="http://schemas.microsoft.com/office/drawing/2014/main" id="{44FFD110-E98B-C4DF-0339-528B12C071A3}"/>
               </a:ext>
             </a:extLst>
           </p:cNvPr>
@@ -2696,7 +2832,7 @@
     </p:spTree>
     <p:extLst>
       <p:ext uri="{BB962C8B-B14F-4D97-AF65-F5344CB8AC3E}">
-        <p14:creationId xmlns:p14="http://schemas.microsoft.com/office/powerpoint/2010/main" val="1586022464"/>
+        <p14:creationId xmlns:p14="http://schemas.microsoft.com/office/powerpoint/2010/main" val="1725607806"/>
       </p:ext>
     </p:extLst>
   </p:cSld>
@@ -2737,7 +2873,7 @@
           <p:cNvPr id="2" name="Заголовок 1" hidden="1">
             <a:extLst>
               <a:ext uri="{FF2B5EF4-FFF2-40B4-BE49-F238E27FC236}">
-                <a16:creationId xmlns:a16="http://schemas.microsoft.com/office/drawing/2014/main" id="{E3C20BD9-6CE6-A254-40FF-8CA573EED86F}"/>
+                <a16:creationId xmlns:a16="http://schemas.microsoft.com/office/drawing/2014/main" id="{0A6EBC24-9929-8842-EF9D-9C397F243925}"/>
               </a:ext>
             </a:extLst>
           </p:cNvPr>
@@ -2771,7 +2907,7 @@
           <p:cNvPr id="3" name="Рисунок 2">
             <a:extLst>
               <a:ext uri="{FF2B5EF4-FFF2-40B4-BE49-F238E27FC236}">
-                <a16:creationId xmlns:a16="http://schemas.microsoft.com/office/drawing/2014/main" id="{0DA7C4D4-BD14-F807-A480-8598E62E9A22}"/>
+                <a16:creationId xmlns:a16="http://schemas.microsoft.com/office/drawing/2014/main" id="{06D52F73-E8A5-5C15-491B-2B8EC595A6C4}"/>
               </a:ext>
             </a:extLst>
           </p:cNvPr>
@@ -2797,7 +2933,7 @@
     </p:spTree>
     <p:extLst>
       <p:ext uri="{BB962C8B-B14F-4D97-AF65-F5344CB8AC3E}">
-        <p14:creationId xmlns:p14="http://schemas.microsoft.com/office/powerpoint/2010/main" val="2000263839"/>
+        <p14:creationId xmlns:p14="http://schemas.microsoft.com/office/powerpoint/2010/main" val="2265560902"/>
       </p:ext>
     </p:extLst>
   </p:cSld>
@@ -2838,7 +2974,7 @@
           <p:cNvPr id="2" name="Заголовок 1" hidden="1">
             <a:extLst>
               <a:ext uri="{FF2B5EF4-FFF2-40B4-BE49-F238E27FC236}">
-                <a16:creationId xmlns:a16="http://schemas.microsoft.com/office/drawing/2014/main" id="{841B5209-3081-0CAE-DCB3-61846ABE465C}"/>
+                <a16:creationId xmlns:a16="http://schemas.microsoft.com/office/drawing/2014/main" id="{80CD0602-D5A9-C4DC-0B43-440BA6C6DEB8}"/>
               </a:ext>
             </a:extLst>
           </p:cNvPr>
@@ -2863,7 +2999,7 @@
           <p:cNvPr id="3" name="Рисунок 2">
             <a:extLst>
               <a:ext uri="{FF2B5EF4-FFF2-40B4-BE49-F238E27FC236}">
-                <a16:creationId xmlns:a16="http://schemas.microsoft.com/office/drawing/2014/main" id="{C4C2D896-140E-C591-2C74-9C6DC43AE944}"/>
+                <a16:creationId xmlns:a16="http://schemas.microsoft.com/office/drawing/2014/main" id="{1155DE77-3116-81EC-0D0A-153E86E8D653}"/>
               </a:ext>
             </a:extLst>
           </p:cNvPr>
@@ -2889,7 +3025,7 @@
     </p:spTree>
     <p:extLst>
       <p:ext uri="{BB962C8B-B14F-4D97-AF65-F5344CB8AC3E}">
-        <p14:creationId xmlns:p14="http://schemas.microsoft.com/office/powerpoint/2010/main" val="2177674072"/>
+        <p14:creationId xmlns:p14="http://schemas.microsoft.com/office/powerpoint/2010/main" val="4150580281"/>
       </p:ext>
     </p:extLst>
   </p:cSld>

</xml_diff>